<commit_message>
Added slides on multiprocessing
</commit_message>
<xml_diff>
--- a/Python/Multiprocessor/concurrent_programming.pptx
+++ b/Python/Multiprocessor/concurrent_programming.pptx
@@ -12,7 +12,10 @@
     <p:sldId id="262" r:id="rId6"/>
     <p:sldId id="263" r:id="rId7"/>
     <p:sldId id="259" r:id="rId8"/>
-    <p:sldId id="260" r:id="rId9"/>
+    <p:sldId id="264" r:id="rId9"/>
+    <p:sldId id="265" r:id="rId10"/>
+    <p:sldId id="266" r:id="rId11"/>
+    <p:sldId id="260" r:id="rId12"/>
   </p:sldIdLst>
   <p:sldSz cx="9144000" cy="6858000" type="screen4x3"/>
   <p:notesSz cx="6858000" cy="9144000"/>
@@ -111,13 +114,29 @@
       </a:defRPr>
     </a:lvl9pPr>
   </p:defaultTextStyle>
+  <p:extLst>
+    <p:ext uri="{EFAFB233-063F-42B5-8137-9DF3F51BA10A}">
+      <p15:sldGuideLst xmlns:p15="http://schemas.microsoft.com/office/powerpoint/2012/main">
+        <p15:guide id="1" orient="horz" pos="2160">
+          <p15:clr>
+            <a:srgbClr val="A4A3A4"/>
+          </p15:clr>
+        </p15:guide>
+        <p15:guide id="2" pos="2880">
+          <p15:clr>
+            <a:srgbClr val="A4A3A4"/>
+          </p15:clr>
+        </p15:guide>
+      </p15:sldGuideLst>
+    </p:ext>
+  </p:extLst>
 </p:presentation>
 </file>
 
 <file path=ppt/charts/chart1.xml><?xml version="1.0" encoding="utf-8"?>
 <c:chartSpace xmlns:c="http://schemas.openxmlformats.org/drawingml/2006/chart" xmlns:a="http://schemas.openxmlformats.org/drawingml/2006/main" xmlns:r="http://schemas.openxmlformats.org/officeDocument/2006/relationships">
   <c:date1904 val="0"/>
-  <c:lang val="nl-BE"/>
+  <c:lang val="en-US"/>
   <c:roundedCorners val="0"/>
   <mc:AlternateContent xmlns:mc="http://schemas.openxmlformats.org/markup-compatibility/2006">
     <mc:Choice xmlns:c14="http://schemas.microsoft.com/office/drawing/2007/8/2/chart" Requires="c14">
@@ -218,11 +237,11 @@
           <c:showPercent val="0"/>
           <c:showBubbleSize val="0"/>
         </c:dLbls>
-        <c:axId val="167670144"/>
-        <c:axId val="167672064"/>
+        <c:axId val="180580016"/>
+        <c:axId val="181251816"/>
       </c:scatterChart>
       <c:valAx>
-        <c:axId val="167670144"/>
+        <c:axId val="180580016"/>
         <c:scaling>
           <c:orientation val="minMax"/>
           <c:max val="20"/>
@@ -233,13 +252,13 @@
         <c:majorTickMark val="out"/>
         <c:minorTickMark val="none"/>
         <c:tickLblPos val="nextTo"/>
-        <c:crossAx val="167672064"/>
+        <c:crossAx val="181251816"/>
         <c:crosses val="autoZero"/>
         <c:crossBetween val="midCat"/>
         <c:majorUnit val="4"/>
       </c:valAx>
       <c:valAx>
-        <c:axId val="167672064"/>
+        <c:axId val="181251816"/>
         <c:scaling>
           <c:orientation val="minMax"/>
         </c:scaling>
@@ -250,7 +269,7 @@
         <c:majorTickMark val="out"/>
         <c:minorTickMark val="none"/>
         <c:tickLblPos val="nextTo"/>
-        <c:crossAx val="167670144"/>
+        <c:crossAx val="180580016"/>
         <c:crosses val="autoZero"/>
         <c:crossBetween val="midCat"/>
       </c:valAx>
@@ -268,7 +287,7 @@
 <file path=ppt/charts/chart2.xml><?xml version="1.0" encoding="utf-8"?>
 <c:chartSpace xmlns:c="http://schemas.openxmlformats.org/drawingml/2006/chart" xmlns:a="http://schemas.openxmlformats.org/drawingml/2006/main" xmlns:r="http://schemas.openxmlformats.org/officeDocument/2006/relationships">
   <c:date1904 val="0"/>
-  <c:lang val="nl-BE"/>
+  <c:lang val="en-US"/>
   <c:roundedCorners val="0"/>
   <mc:AlternateContent xmlns:mc="http://schemas.openxmlformats.org/markup-compatibility/2006">
     <mc:Choice xmlns:c14="http://schemas.microsoft.com/office/drawing/2007/8/2/chart" Requires="c14">
@@ -369,11 +388,11 @@
           <c:showPercent val="0"/>
           <c:showBubbleSize val="0"/>
         </c:dLbls>
-        <c:axId val="122532224"/>
-        <c:axId val="122533760"/>
+        <c:axId val="181250640"/>
+        <c:axId val="181250248"/>
       </c:scatterChart>
       <c:valAx>
-        <c:axId val="122532224"/>
+        <c:axId val="181250640"/>
         <c:scaling>
           <c:orientation val="minMax"/>
           <c:max val="20"/>
@@ -384,13 +403,13 @@
         <c:majorTickMark val="out"/>
         <c:minorTickMark val="none"/>
         <c:tickLblPos val="nextTo"/>
-        <c:crossAx val="122533760"/>
+        <c:crossAx val="181250248"/>
         <c:crosses val="autoZero"/>
         <c:crossBetween val="midCat"/>
         <c:majorUnit val="4"/>
       </c:valAx>
       <c:valAx>
-        <c:axId val="122533760"/>
+        <c:axId val="181250248"/>
         <c:scaling>
           <c:orientation val="minMax"/>
           <c:max val="1"/>
@@ -402,7 +421,7 @@
         <c:majorTickMark val="out"/>
         <c:minorTickMark val="none"/>
         <c:tickLblPos val="nextTo"/>
-        <c:crossAx val="122532224"/>
+        <c:crossAx val="181250640"/>
         <c:crosses val="autoZero"/>
         <c:crossBetween val="midCat"/>
       </c:valAx>
@@ -425,7 +444,7 @@
 <file path=ppt/charts/chart3.xml><?xml version="1.0" encoding="utf-8"?>
 <c:chartSpace xmlns:c="http://schemas.openxmlformats.org/drawingml/2006/chart" xmlns:a="http://schemas.openxmlformats.org/drawingml/2006/main" xmlns:r="http://schemas.openxmlformats.org/officeDocument/2006/relationships">
   <c:date1904 val="0"/>
-  <c:lang val="nl-BE"/>
+  <c:lang val="en-US"/>
   <c:roundedCorners val="0"/>
   <mc:AlternateContent xmlns:mc="http://schemas.openxmlformats.org/markup-compatibility/2006">
     <mc:Choice xmlns:c14="http://schemas.microsoft.com/office/drawing/2007/8/2/chart" Requires="c14">
@@ -526,11 +545,11 @@
           <c:showPercent val="0"/>
           <c:showBubbleSize val="0"/>
         </c:dLbls>
-        <c:axId val="122611200"/>
-        <c:axId val="122615296"/>
+        <c:axId val="181249464"/>
+        <c:axId val="160886720"/>
       </c:scatterChart>
       <c:valAx>
-        <c:axId val="122611200"/>
+        <c:axId val="181249464"/>
         <c:scaling>
           <c:orientation val="minMax"/>
           <c:max val="20"/>
@@ -541,13 +560,13 @@
         <c:majorTickMark val="out"/>
         <c:minorTickMark val="none"/>
         <c:tickLblPos val="nextTo"/>
-        <c:crossAx val="122615296"/>
+        <c:crossAx val="160886720"/>
         <c:crosses val="autoZero"/>
         <c:crossBetween val="midCat"/>
         <c:majorUnit val="4"/>
       </c:valAx>
       <c:valAx>
-        <c:axId val="122615296"/>
+        <c:axId val="160886720"/>
         <c:scaling>
           <c:orientation val="minMax"/>
           <c:min val="1"/>
@@ -559,7 +578,7 @@
         <c:majorTickMark val="out"/>
         <c:minorTickMark val="none"/>
         <c:tickLblPos val="nextTo"/>
-        <c:crossAx val="122611200"/>
+        <c:crossAx val="181249464"/>
         <c:crosses val="autoZero"/>
         <c:crossBetween val="midCat"/>
       </c:valAx>
@@ -577,7 +596,7 @@
 <file path=ppt/charts/chart4.xml><?xml version="1.0" encoding="utf-8"?>
 <c:chartSpace xmlns:c="http://schemas.openxmlformats.org/drawingml/2006/chart" xmlns:a="http://schemas.openxmlformats.org/drawingml/2006/main" xmlns:r="http://schemas.openxmlformats.org/officeDocument/2006/relationships">
   <c:date1904 val="0"/>
-  <c:lang val="nl-BE"/>
+  <c:lang val="en-US"/>
   <c:roundedCorners val="0"/>
   <mc:AlternateContent xmlns:mc="http://schemas.openxmlformats.org/markup-compatibility/2006">
     <mc:Choice xmlns:c14="http://schemas.microsoft.com/office/drawing/2007/8/2/chart" Requires="c14">
@@ -678,11 +697,11 @@
           <c:showPercent val="0"/>
           <c:showBubbleSize val="0"/>
         </c:dLbls>
-        <c:axId val="124181504"/>
-        <c:axId val="124388096"/>
+        <c:axId val="160889072"/>
+        <c:axId val="160888288"/>
       </c:scatterChart>
       <c:valAx>
-        <c:axId val="124181504"/>
+        <c:axId val="160889072"/>
         <c:scaling>
           <c:orientation val="minMax"/>
           <c:max val="20"/>
@@ -693,13 +712,13 @@
         <c:majorTickMark val="out"/>
         <c:minorTickMark val="none"/>
         <c:tickLblPos val="nextTo"/>
-        <c:crossAx val="124388096"/>
+        <c:crossAx val="160888288"/>
         <c:crosses val="autoZero"/>
         <c:crossBetween val="midCat"/>
         <c:majorUnit val="4"/>
       </c:valAx>
       <c:valAx>
-        <c:axId val="124388096"/>
+        <c:axId val="160888288"/>
         <c:scaling>
           <c:orientation val="minMax"/>
           <c:max val="1"/>
@@ -711,7 +730,7 @@
         <c:majorTickMark val="out"/>
         <c:minorTickMark val="none"/>
         <c:tickLblPos val="nextTo"/>
-        <c:crossAx val="124181504"/>
+        <c:crossAx val="160889072"/>
         <c:crosses val="autoZero"/>
         <c:crossBetween val="midCat"/>
       </c:valAx>
@@ -913,7 +932,7 @@
             <a:fld id="{1D8BD707-D9CF-40AE-B4C6-C98DA3205C09}" type="datetimeFigureOut">
               <a:rPr lang="en-US" smtClean="0"/>
               <a:pPr/>
-              <a:t>2016-03-08</a:t>
+              <a:t>3/8/2016</a:t>
             </a:fld>
             <a:endParaRPr lang="en-US"/>
           </a:p>
@@ -1080,7 +1099,7 @@
             <a:fld id="{1D8BD707-D9CF-40AE-B4C6-C98DA3205C09}" type="datetimeFigureOut">
               <a:rPr lang="en-US" smtClean="0"/>
               <a:pPr/>
-              <a:t>2016-03-08</a:t>
+              <a:t>3/8/2016</a:t>
             </a:fld>
             <a:endParaRPr lang="en-US"/>
           </a:p>
@@ -1257,7 +1276,7 @@
             <a:fld id="{1D8BD707-D9CF-40AE-B4C6-C98DA3205C09}" type="datetimeFigureOut">
               <a:rPr lang="en-US" smtClean="0"/>
               <a:pPr/>
-              <a:t>2016-03-08</a:t>
+              <a:t>3/8/2016</a:t>
             </a:fld>
             <a:endParaRPr lang="en-US"/>
           </a:p>
@@ -1424,7 +1443,7 @@
             <a:fld id="{1D8BD707-D9CF-40AE-B4C6-C98DA3205C09}" type="datetimeFigureOut">
               <a:rPr lang="en-US" smtClean="0"/>
               <a:pPr/>
-              <a:t>2016-03-08</a:t>
+              <a:t>3/8/2016</a:t>
             </a:fld>
             <a:endParaRPr lang="en-US"/>
           </a:p>
@@ -1667,7 +1686,7 @@
             <a:fld id="{1D8BD707-D9CF-40AE-B4C6-C98DA3205C09}" type="datetimeFigureOut">
               <a:rPr lang="en-US" smtClean="0"/>
               <a:pPr/>
-              <a:t>2016-03-08</a:t>
+              <a:t>3/8/2016</a:t>
             </a:fld>
             <a:endParaRPr lang="en-US"/>
           </a:p>
@@ -1952,7 +1971,7 @@
             <a:fld id="{1D8BD707-D9CF-40AE-B4C6-C98DA3205C09}" type="datetimeFigureOut">
               <a:rPr lang="en-US" smtClean="0"/>
               <a:pPr/>
-              <a:t>2016-03-08</a:t>
+              <a:t>3/8/2016</a:t>
             </a:fld>
             <a:endParaRPr lang="en-US"/>
           </a:p>
@@ -2371,7 +2390,7 @@
             <a:fld id="{1D8BD707-D9CF-40AE-B4C6-C98DA3205C09}" type="datetimeFigureOut">
               <a:rPr lang="en-US" smtClean="0"/>
               <a:pPr/>
-              <a:t>2016-03-08</a:t>
+              <a:t>3/8/2016</a:t>
             </a:fld>
             <a:endParaRPr lang="en-US"/>
           </a:p>
@@ -2486,7 +2505,7 @@
             <a:fld id="{1D8BD707-D9CF-40AE-B4C6-C98DA3205C09}" type="datetimeFigureOut">
               <a:rPr lang="en-US" smtClean="0"/>
               <a:pPr/>
-              <a:t>2016-03-08</a:t>
+              <a:t>3/8/2016</a:t>
             </a:fld>
             <a:endParaRPr lang="en-US"/>
           </a:p>
@@ -2578,7 +2597,7 @@
             <a:fld id="{1D8BD707-D9CF-40AE-B4C6-C98DA3205C09}" type="datetimeFigureOut">
               <a:rPr lang="en-US" smtClean="0"/>
               <a:pPr/>
-              <a:t>2016-03-08</a:t>
+              <a:t>3/8/2016</a:t>
             </a:fld>
             <a:endParaRPr lang="en-US"/>
           </a:p>
@@ -2852,7 +2871,7 @@
             <a:fld id="{1D8BD707-D9CF-40AE-B4C6-C98DA3205C09}" type="datetimeFigureOut">
               <a:rPr lang="en-US" smtClean="0"/>
               <a:pPr/>
-              <a:t>2016-03-08</a:t>
+              <a:t>3/8/2016</a:t>
             </a:fld>
             <a:endParaRPr lang="en-US"/>
           </a:p>
@@ -3102,7 +3121,7 @@
             <a:fld id="{1D8BD707-D9CF-40AE-B4C6-C98DA3205C09}" type="datetimeFigureOut">
               <a:rPr lang="en-US" smtClean="0"/>
               <a:pPr/>
-              <a:t>2016-03-08</a:t>
+              <a:t>3/8/2016</a:t>
             </a:fld>
             <a:endParaRPr lang="en-US"/>
           </a:p>
@@ -3312,7 +3331,7 @@
             <a:fld id="{1D8BD707-D9CF-40AE-B4C6-C98DA3205C09}" type="datetimeFigureOut">
               <a:rPr lang="en-US" smtClean="0"/>
               <a:pPr/>
-              <a:t>2016-03-08</a:t>
+              <a:t>3/8/2016</a:t>
             </a:fld>
             <a:endParaRPr lang="en-US"/>
           </a:p>
@@ -3752,6 +3771,1544 @@
     <p:extLst>
       <p:ext uri="{BB962C8B-B14F-4D97-AF65-F5344CB8AC3E}">
         <p14:creationId xmlns:p14="http://schemas.microsoft.com/office/powerpoint/2010/main" val="3103577567"/>
+      </p:ext>
+    </p:extLst>
+  </p:cSld>
+  <p:clrMapOvr>
+    <a:masterClrMapping/>
+  </p:clrMapOvr>
+  <p:timing>
+    <p:tnLst>
+      <p:par>
+        <p:cTn id="1" dur="indefinite" restart="never" nodeType="tmRoot"/>
+      </p:par>
+    </p:tnLst>
+  </p:timing>
+</p:sld>
+</file>
+
+<file path=ppt/slides/slide10.xml><?xml version="1.0" encoding="utf-8"?>
+<p:sld xmlns:a="http://schemas.openxmlformats.org/drawingml/2006/main" xmlns:r="http://schemas.openxmlformats.org/officeDocument/2006/relationships" xmlns:p="http://schemas.openxmlformats.org/presentationml/2006/main">
+  <p:cSld>
+    <p:spTree>
+      <p:nvGrpSpPr>
+        <p:cNvPr id="1" name=""/>
+        <p:cNvGrpSpPr/>
+        <p:nvPr/>
+      </p:nvGrpSpPr>
+      <p:grpSpPr>
+        <a:xfrm>
+          <a:off x="0" y="0"/>
+          <a:ext cx="0" cy="0"/>
+          <a:chOff x="0" y="0"/>
+          <a:chExt cx="0" cy="0"/>
+        </a:xfrm>
+      </p:grpSpPr>
+      <p:sp>
+        <p:nvSpPr>
+          <p:cNvPr id="2" name="Title 1"/>
+          <p:cNvSpPr>
+            <a:spLocks noGrp="1"/>
+          </p:cNvSpPr>
+          <p:nvPr>
+            <p:ph type="title"/>
+          </p:nvPr>
+        </p:nvSpPr>
+        <p:spPr/>
+        <p:txBody>
+          <a:bodyPr/>
+          <a:lstStyle/>
+          <a:p>
+            <a:r>
+              <a:rPr lang="en-US" dirty="0" err="1" smtClean="0"/>
+              <a:t>Throw'em</a:t>
+            </a:r>
+            <a:r>
+              <a:rPr lang="en-US" dirty="0" smtClean="0"/>
+              <a:t> in the pool!</a:t>
+            </a:r>
+            <a:endParaRPr lang="nl-BE" dirty="0"/>
+          </a:p>
+        </p:txBody>
+      </p:sp>
+      <p:sp>
+        <p:nvSpPr>
+          <p:cNvPr id="4" name="TextBox 3"/>
+          <p:cNvSpPr txBox="1"/>
+          <p:nvPr/>
+        </p:nvSpPr>
+        <p:spPr>
+          <a:xfrm>
+            <a:off x="1641796" y="2021681"/>
+            <a:ext cx="6664004" cy="3693319"/>
+          </a:xfrm>
+          <a:prstGeom prst="rect">
+            <a:avLst/>
+          </a:prstGeom>
+          <a:solidFill>
+            <a:schemeClr val="bg1">
+              <a:lumMod val="85000"/>
+            </a:schemeClr>
+          </a:solidFill>
+        </p:spPr>
+        <p:txBody>
+          <a:bodyPr wrap="none" rtlCol="0">
+            <a:spAutoFit/>
+          </a:bodyPr>
+          <a:lstStyle/>
+          <a:p>
+            <a:r>
+              <a:rPr lang="nl-BE" dirty="0" err="1">
+                <a:latin typeface="Courier New" panose="02070309020205020404" pitchFamily="49" charset="0"/>
+                <a:cs typeface="Courier New" panose="02070309020205020404" pitchFamily="49" charset="0"/>
+              </a:rPr>
+              <a:t>def</a:t>
+            </a:r>
+            <a:r>
+              <a:rPr lang="nl-BE" dirty="0">
+                <a:latin typeface="Courier New" panose="02070309020205020404" pitchFamily="49" charset="0"/>
+                <a:cs typeface="Courier New" panose="02070309020205020404" pitchFamily="49" charset="0"/>
+              </a:rPr>
+              <a:t> </a:t>
+            </a:r>
+            <a:r>
+              <a:rPr lang="nl-BE" dirty="0" err="1">
+                <a:latin typeface="Courier New" panose="02070309020205020404" pitchFamily="49" charset="0"/>
+                <a:cs typeface="Courier New" panose="02070309020205020404" pitchFamily="49" charset="0"/>
+              </a:rPr>
+              <a:t>count_nucl</a:t>
+            </a:r>
+            <a:r>
+              <a:rPr lang="nl-BE" dirty="0">
+                <a:latin typeface="Courier New" panose="02070309020205020404" pitchFamily="49" charset="0"/>
+                <a:cs typeface="Courier New" panose="02070309020205020404" pitchFamily="49" charset="0"/>
+              </a:rPr>
+              <a:t>(</a:t>
+            </a:r>
+            <a:r>
+              <a:rPr lang="nl-BE" dirty="0" err="1">
+                <a:latin typeface="Courier New" panose="02070309020205020404" pitchFamily="49" charset="0"/>
+                <a:cs typeface="Courier New" panose="02070309020205020404" pitchFamily="49" charset="0"/>
+              </a:rPr>
+              <a:t>file_name</a:t>
+            </a:r>
+            <a:r>
+              <a:rPr lang="nl-BE" dirty="0">
+                <a:latin typeface="Courier New" panose="02070309020205020404" pitchFamily="49" charset="0"/>
+                <a:cs typeface="Courier New" panose="02070309020205020404" pitchFamily="49" charset="0"/>
+              </a:rPr>
+              <a:t>, </a:t>
+            </a:r>
+            <a:r>
+              <a:rPr lang="nl-BE" dirty="0" err="1">
+                <a:latin typeface="Courier New" panose="02070309020205020404" pitchFamily="49" charset="0"/>
+                <a:cs typeface="Courier New" panose="02070309020205020404" pitchFamily="49" charset="0"/>
+              </a:rPr>
+              <a:t>pool_size</a:t>
+            </a:r>
+            <a:r>
+              <a:rPr lang="nl-BE" dirty="0">
+                <a:latin typeface="Courier New" panose="02070309020205020404" pitchFamily="49" charset="0"/>
+                <a:cs typeface="Courier New" panose="02070309020205020404" pitchFamily="49" charset="0"/>
+              </a:rPr>
+              <a:t>):</a:t>
+            </a:r>
+          </a:p>
+          <a:p>
+            <a:r>
+              <a:rPr lang="nl-BE" dirty="0">
+                <a:latin typeface="Courier New" panose="02070309020205020404" pitchFamily="49" charset="0"/>
+                <a:cs typeface="Courier New" panose="02070309020205020404" pitchFamily="49" charset="0"/>
+              </a:rPr>
+              <a:t>    </a:t>
+            </a:r>
+            <a:r>
+              <a:rPr lang="nl-BE" dirty="0" err="1">
+                <a:latin typeface="Courier New" panose="02070309020205020404" pitchFamily="49" charset="0"/>
+                <a:cs typeface="Courier New" panose="02070309020205020404" pitchFamily="49" charset="0"/>
+              </a:rPr>
+              <a:t>file_size</a:t>
+            </a:r>
+            <a:r>
+              <a:rPr lang="nl-BE" dirty="0">
+                <a:latin typeface="Courier New" panose="02070309020205020404" pitchFamily="49" charset="0"/>
+                <a:cs typeface="Courier New" panose="02070309020205020404" pitchFamily="49" charset="0"/>
+              </a:rPr>
+              <a:t> = </a:t>
+            </a:r>
+            <a:r>
+              <a:rPr lang="nl-BE" dirty="0" err="1">
+                <a:latin typeface="Courier New" panose="02070309020205020404" pitchFamily="49" charset="0"/>
+                <a:cs typeface="Courier New" panose="02070309020205020404" pitchFamily="49" charset="0"/>
+              </a:rPr>
+              <a:t>os.path.getsize</a:t>
+            </a:r>
+            <a:r>
+              <a:rPr lang="nl-BE" dirty="0">
+                <a:latin typeface="Courier New" panose="02070309020205020404" pitchFamily="49" charset="0"/>
+                <a:cs typeface="Courier New" panose="02070309020205020404" pitchFamily="49" charset="0"/>
+              </a:rPr>
+              <a:t>(</a:t>
+            </a:r>
+            <a:r>
+              <a:rPr lang="nl-BE" dirty="0" err="1">
+                <a:latin typeface="Courier New" panose="02070309020205020404" pitchFamily="49" charset="0"/>
+                <a:cs typeface="Courier New" panose="02070309020205020404" pitchFamily="49" charset="0"/>
+              </a:rPr>
+              <a:t>file_name</a:t>
+            </a:r>
+            <a:r>
+              <a:rPr lang="nl-BE" dirty="0">
+                <a:latin typeface="Courier New" panose="02070309020205020404" pitchFamily="49" charset="0"/>
+                <a:cs typeface="Courier New" panose="02070309020205020404" pitchFamily="49" charset="0"/>
+              </a:rPr>
+              <a:t>)</a:t>
+            </a:r>
+          </a:p>
+          <a:p>
+            <a:r>
+              <a:rPr lang="nl-BE" dirty="0">
+                <a:latin typeface="Courier New" panose="02070309020205020404" pitchFamily="49" charset="0"/>
+                <a:cs typeface="Courier New" panose="02070309020205020404" pitchFamily="49" charset="0"/>
+              </a:rPr>
+              <a:t>    </a:t>
+            </a:r>
+            <a:r>
+              <a:rPr lang="nl-BE" dirty="0" err="1">
+                <a:latin typeface="Courier New" panose="02070309020205020404" pitchFamily="49" charset="0"/>
+                <a:cs typeface="Courier New" panose="02070309020205020404" pitchFamily="49" charset="0"/>
+              </a:rPr>
+              <a:t>chunk_size</a:t>
+            </a:r>
+            <a:r>
+              <a:rPr lang="nl-BE" dirty="0">
+                <a:latin typeface="Courier New" panose="02070309020205020404" pitchFamily="49" charset="0"/>
+                <a:cs typeface="Courier New" panose="02070309020205020404" pitchFamily="49" charset="0"/>
+              </a:rPr>
+              <a:t> = </a:t>
+            </a:r>
+            <a:r>
+              <a:rPr lang="nl-BE" dirty="0" err="1">
+                <a:latin typeface="Courier New" panose="02070309020205020404" pitchFamily="49" charset="0"/>
+                <a:cs typeface="Courier New" panose="02070309020205020404" pitchFamily="49" charset="0"/>
+              </a:rPr>
+              <a:t>file_size</a:t>
+            </a:r>
+            <a:r>
+              <a:rPr lang="nl-BE" dirty="0">
+                <a:latin typeface="Courier New" panose="02070309020205020404" pitchFamily="49" charset="0"/>
+                <a:cs typeface="Courier New" panose="02070309020205020404" pitchFamily="49" charset="0"/>
+              </a:rPr>
+              <a:t>//</a:t>
+            </a:r>
+            <a:r>
+              <a:rPr lang="nl-BE" dirty="0" err="1">
+                <a:latin typeface="Courier New" panose="02070309020205020404" pitchFamily="49" charset="0"/>
+                <a:cs typeface="Courier New" panose="02070309020205020404" pitchFamily="49" charset="0"/>
+              </a:rPr>
+              <a:t>pool_size</a:t>
+            </a:r>
+            <a:r>
+              <a:rPr lang="nl-BE" dirty="0">
+                <a:latin typeface="Courier New" panose="02070309020205020404" pitchFamily="49" charset="0"/>
+                <a:cs typeface="Courier New" panose="02070309020205020404" pitchFamily="49" charset="0"/>
+              </a:rPr>
+              <a:t> + 1</a:t>
+            </a:r>
+          </a:p>
+          <a:p>
+            <a:r>
+              <a:rPr lang="nl-BE" dirty="0">
+                <a:latin typeface="Courier New" panose="02070309020205020404" pitchFamily="49" charset="0"/>
+                <a:cs typeface="Courier New" panose="02070309020205020404" pitchFamily="49" charset="0"/>
+              </a:rPr>
+              <a:t>    </a:t>
+            </a:r>
+            <a:r>
+              <a:rPr lang="nl-BE" dirty="0" err="1">
+                <a:latin typeface="Courier New" panose="02070309020205020404" pitchFamily="49" charset="0"/>
+                <a:cs typeface="Courier New" panose="02070309020205020404" pitchFamily="49" charset="0"/>
+              </a:rPr>
+              <a:t>offsets</a:t>
+            </a:r>
+            <a:r>
+              <a:rPr lang="nl-BE" dirty="0">
+                <a:latin typeface="Courier New" panose="02070309020205020404" pitchFamily="49" charset="0"/>
+                <a:cs typeface="Courier New" panose="02070309020205020404" pitchFamily="49" charset="0"/>
+              </a:rPr>
+              <a:t> = range(0, </a:t>
+            </a:r>
+            <a:r>
+              <a:rPr lang="nl-BE" dirty="0" err="1">
+                <a:latin typeface="Courier New" panose="02070309020205020404" pitchFamily="49" charset="0"/>
+                <a:cs typeface="Courier New" panose="02070309020205020404" pitchFamily="49" charset="0"/>
+              </a:rPr>
+              <a:t>file_size</a:t>
+            </a:r>
+            <a:r>
+              <a:rPr lang="nl-BE" dirty="0">
+                <a:latin typeface="Courier New" panose="02070309020205020404" pitchFamily="49" charset="0"/>
+                <a:cs typeface="Courier New" panose="02070309020205020404" pitchFamily="49" charset="0"/>
+              </a:rPr>
+              <a:t>, </a:t>
+            </a:r>
+            <a:r>
+              <a:rPr lang="nl-BE" dirty="0" err="1">
+                <a:latin typeface="Courier New" panose="02070309020205020404" pitchFamily="49" charset="0"/>
+                <a:cs typeface="Courier New" panose="02070309020205020404" pitchFamily="49" charset="0"/>
+              </a:rPr>
+              <a:t>chunk_size</a:t>
+            </a:r>
+            <a:r>
+              <a:rPr lang="nl-BE" dirty="0">
+                <a:latin typeface="Courier New" panose="02070309020205020404" pitchFamily="49" charset="0"/>
+                <a:cs typeface="Courier New" panose="02070309020205020404" pitchFamily="49" charset="0"/>
+              </a:rPr>
+              <a:t>)</a:t>
+            </a:r>
+          </a:p>
+          <a:p>
+            <a:r>
+              <a:rPr lang="nl-BE" dirty="0">
+                <a:latin typeface="Courier New" panose="02070309020205020404" pitchFamily="49" charset="0"/>
+                <a:cs typeface="Courier New" panose="02070309020205020404" pitchFamily="49" charset="0"/>
+              </a:rPr>
+              <a:t>    </a:t>
+            </a:r>
+            <a:r>
+              <a:rPr lang="nl-BE" dirty="0" err="1">
+                <a:latin typeface="Courier New" panose="02070309020205020404" pitchFamily="49" charset="0"/>
+                <a:cs typeface="Courier New" panose="02070309020205020404" pitchFamily="49" charset="0"/>
+              </a:rPr>
+              <a:t>args</a:t>
+            </a:r>
+            <a:r>
+              <a:rPr lang="nl-BE" dirty="0">
+                <a:latin typeface="Courier New" panose="02070309020205020404" pitchFamily="49" charset="0"/>
+                <a:cs typeface="Courier New" panose="02070309020205020404" pitchFamily="49" charset="0"/>
+              </a:rPr>
+              <a:t> = [(</a:t>
+            </a:r>
+            <a:r>
+              <a:rPr lang="nl-BE" dirty="0" err="1">
+                <a:latin typeface="Courier New" panose="02070309020205020404" pitchFamily="49" charset="0"/>
+                <a:cs typeface="Courier New" panose="02070309020205020404" pitchFamily="49" charset="0"/>
+              </a:rPr>
+              <a:t>file_name</a:t>
+            </a:r>
+            <a:r>
+              <a:rPr lang="nl-BE" dirty="0">
+                <a:latin typeface="Courier New" panose="02070309020205020404" pitchFamily="49" charset="0"/>
+                <a:cs typeface="Courier New" panose="02070309020205020404" pitchFamily="49" charset="0"/>
+              </a:rPr>
+              <a:t>, offset, </a:t>
+            </a:r>
+            <a:r>
+              <a:rPr lang="nl-BE" dirty="0" err="1" smtClean="0">
+                <a:latin typeface="Courier New" panose="02070309020205020404" pitchFamily="49" charset="0"/>
+                <a:cs typeface="Courier New" panose="02070309020205020404" pitchFamily="49" charset="0"/>
+              </a:rPr>
+              <a:t>chunk_size</a:t>
+            </a:r>
+            <a:r>
+              <a:rPr lang="nl-BE" dirty="0" smtClean="0">
+                <a:latin typeface="Courier New" panose="02070309020205020404" pitchFamily="49" charset="0"/>
+                <a:cs typeface="Courier New" panose="02070309020205020404" pitchFamily="49" charset="0"/>
+              </a:rPr>
+              <a:t>)</a:t>
+            </a:r>
+          </a:p>
+          <a:p>
+            <a:r>
+              <a:rPr lang="nl-BE" dirty="0">
+                <a:latin typeface="Courier New" panose="02070309020205020404" pitchFamily="49" charset="0"/>
+                <a:cs typeface="Courier New" panose="02070309020205020404" pitchFamily="49" charset="0"/>
+              </a:rPr>
+              <a:t> </a:t>
+            </a:r>
+            <a:r>
+              <a:rPr lang="nl-BE" dirty="0" smtClean="0">
+                <a:latin typeface="Courier New" panose="02070309020205020404" pitchFamily="49" charset="0"/>
+                <a:cs typeface="Courier New" panose="02070309020205020404" pitchFamily="49" charset="0"/>
+              </a:rPr>
+              <a:t>           </a:t>
+            </a:r>
+            <a:r>
+              <a:rPr lang="nl-BE" dirty="0" err="1" smtClean="0">
+                <a:latin typeface="Courier New" panose="02070309020205020404" pitchFamily="49" charset="0"/>
+                <a:cs typeface="Courier New" panose="02070309020205020404" pitchFamily="49" charset="0"/>
+              </a:rPr>
+              <a:t>for</a:t>
+            </a:r>
+            <a:r>
+              <a:rPr lang="nl-BE" dirty="0" smtClean="0">
+                <a:latin typeface="Courier New" panose="02070309020205020404" pitchFamily="49" charset="0"/>
+                <a:cs typeface="Courier New" panose="02070309020205020404" pitchFamily="49" charset="0"/>
+              </a:rPr>
+              <a:t> </a:t>
+            </a:r>
+            <a:r>
+              <a:rPr lang="nl-BE" dirty="0">
+                <a:latin typeface="Courier New" panose="02070309020205020404" pitchFamily="49" charset="0"/>
+                <a:cs typeface="Courier New" panose="02070309020205020404" pitchFamily="49" charset="0"/>
+              </a:rPr>
+              <a:t>offset in </a:t>
+            </a:r>
+            <a:r>
+              <a:rPr lang="nl-BE" dirty="0" err="1">
+                <a:latin typeface="Courier New" panose="02070309020205020404" pitchFamily="49" charset="0"/>
+                <a:cs typeface="Courier New" panose="02070309020205020404" pitchFamily="49" charset="0"/>
+              </a:rPr>
+              <a:t>offsets</a:t>
+            </a:r>
+            <a:r>
+              <a:rPr lang="nl-BE" dirty="0">
+                <a:latin typeface="Courier New" panose="02070309020205020404" pitchFamily="49" charset="0"/>
+                <a:cs typeface="Courier New" panose="02070309020205020404" pitchFamily="49" charset="0"/>
+              </a:rPr>
+              <a:t>]</a:t>
+            </a:r>
+          </a:p>
+          <a:p>
+            <a:r>
+              <a:rPr lang="nl-BE" dirty="0">
+                <a:latin typeface="Courier New" panose="02070309020205020404" pitchFamily="49" charset="0"/>
+                <a:cs typeface="Courier New" panose="02070309020205020404" pitchFamily="49" charset="0"/>
+              </a:rPr>
+              <a:t>    pool = </a:t>
+            </a:r>
+            <a:r>
+              <a:rPr lang="nl-BE" dirty="0" err="1">
+                <a:latin typeface="Courier New" panose="02070309020205020404" pitchFamily="49" charset="0"/>
+                <a:cs typeface="Courier New" panose="02070309020205020404" pitchFamily="49" charset="0"/>
+              </a:rPr>
+              <a:t>multiprocessing.Pool</a:t>
+            </a:r>
+            <a:r>
+              <a:rPr lang="nl-BE" dirty="0">
+                <a:latin typeface="Courier New" panose="02070309020205020404" pitchFamily="49" charset="0"/>
+                <a:cs typeface="Courier New" panose="02070309020205020404" pitchFamily="49" charset="0"/>
+              </a:rPr>
+              <a:t>(</a:t>
+            </a:r>
+            <a:r>
+              <a:rPr lang="nl-BE" dirty="0" err="1">
+                <a:latin typeface="Courier New" panose="02070309020205020404" pitchFamily="49" charset="0"/>
+                <a:cs typeface="Courier New" panose="02070309020205020404" pitchFamily="49" charset="0"/>
+              </a:rPr>
+              <a:t>pool_size</a:t>
+            </a:r>
+            <a:r>
+              <a:rPr lang="nl-BE" dirty="0">
+                <a:latin typeface="Courier New" panose="02070309020205020404" pitchFamily="49" charset="0"/>
+                <a:cs typeface="Courier New" panose="02070309020205020404" pitchFamily="49" charset="0"/>
+              </a:rPr>
+              <a:t>)</a:t>
+            </a:r>
+          </a:p>
+          <a:p>
+            <a:r>
+              <a:rPr lang="nl-BE" dirty="0">
+                <a:latin typeface="Courier New" panose="02070309020205020404" pitchFamily="49" charset="0"/>
+                <a:cs typeface="Courier New" panose="02070309020205020404" pitchFamily="49" charset="0"/>
+              </a:rPr>
+              <a:t>    counters = </a:t>
+            </a:r>
+            <a:r>
+              <a:rPr lang="nl-BE" dirty="0" err="1">
+                <a:latin typeface="Courier New" panose="02070309020205020404" pitchFamily="49" charset="0"/>
+                <a:cs typeface="Courier New" panose="02070309020205020404" pitchFamily="49" charset="0"/>
+              </a:rPr>
+              <a:t>pool.map</a:t>
+            </a:r>
+            <a:r>
+              <a:rPr lang="nl-BE" dirty="0">
+                <a:latin typeface="Courier New" panose="02070309020205020404" pitchFamily="49" charset="0"/>
+                <a:cs typeface="Courier New" panose="02070309020205020404" pitchFamily="49" charset="0"/>
+              </a:rPr>
+              <a:t>(</a:t>
+            </a:r>
+            <a:r>
+              <a:rPr lang="nl-BE" dirty="0" err="1">
+                <a:latin typeface="Courier New" panose="02070309020205020404" pitchFamily="49" charset="0"/>
+                <a:cs typeface="Courier New" panose="02070309020205020404" pitchFamily="49" charset="0"/>
+              </a:rPr>
+              <a:t>count_chunk</a:t>
+            </a:r>
+            <a:r>
+              <a:rPr lang="nl-BE" dirty="0">
+                <a:latin typeface="Courier New" panose="02070309020205020404" pitchFamily="49" charset="0"/>
+                <a:cs typeface="Courier New" panose="02070309020205020404" pitchFamily="49" charset="0"/>
+              </a:rPr>
+              <a:t>, </a:t>
+            </a:r>
+            <a:r>
+              <a:rPr lang="nl-BE" dirty="0" err="1">
+                <a:latin typeface="Courier New" panose="02070309020205020404" pitchFamily="49" charset="0"/>
+                <a:cs typeface="Courier New" panose="02070309020205020404" pitchFamily="49" charset="0"/>
+              </a:rPr>
+              <a:t>args</a:t>
+            </a:r>
+            <a:r>
+              <a:rPr lang="nl-BE" dirty="0">
+                <a:latin typeface="Courier New" panose="02070309020205020404" pitchFamily="49" charset="0"/>
+                <a:cs typeface="Courier New" panose="02070309020205020404" pitchFamily="49" charset="0"/>
+              </a:rPr>
+              <a:t>)</a:t>
+            </a:r>
+          </a:p>
+          <a:p>
+            <a:r>
+              <a:rPr lang="nl-BE" dirty="0">
+                <a:latin typeface="Courier New" panose="02070309020205020404" pitchFamily="49" charset="0"/>
+                <a:cs typeface="Courier New" panose="02070309020205020404" pitchFamily="49" charset="0"/>
+              </a:rPr>
+              <a:t>    counter = {'A': 0, 'C': 0, 'G': 0, </a:t>
+            </a:r>
+            <a:r>
+              <a:rPr lang="nl-BE" dirty="0" err="1">
+                <a:latin typeface="Courier New" panose="02070309020205020404" pitchFamily="49" charset="0"/>
+                <a:cs typeface="Courier New" panose="02070309020205020404" pitchFamily="49" charset="0"/>
+              </a:rPr>
+              <a:t>'T</a:t>
+            </a:r>
+            <a:r>
+              <a:rPr lang="nl-BE" dirty="0">
+                <a:latin typeface="Courier New" panose="02070309020205020404" pitchFamily="49" charset="0"/>
+                <a:cs typeface="Courier New" panose="02070309020205020404" pitchFamily="49" charset="0"/>
+              </a:rPr>
+              <a:t>': 0}</a:t>
+            </a:r>
+          </a:p>
+          <a:p>
+            <a:r>
+              <a:rPr lang="nl-BE" dirty="0">
+                <a:latin typeface="Courier New" panose="02070309020205020404" pitchFamily="49" charset="0"/>
+                <a:cs typeface="Courier New" panose="02070309020205020404" pitchFamily="49" charset="0"/>
+              </a:rPr>
+              <a:t>    </a:t>
+            </a:r>
+            <a:r>
+              <a:rPr lang="nl-BE" dirty="0" err="1">
+                <a:latin typeface="Courier New" panose="02070309020205020404" pitchFamily="49" charset="0"/>
+                <a:cs typeface="Courier New" panose="02070309020205020404" pitchFamily="49" charset="0"/>
+              </a:rPr>
+              <a:t>for</a:t>
+            </a:r>
+            <a:r>
+              <a:rPr lang="nl-BE" dirty="0">
+                <a:latin typeface="Courier New" panose="02070309020205020404" pitchFamily="49" charset="0"/>
+                <a:cs typeface="Courier New" panose="02070309020205020404" pitchFamily="49" charset="0"/>
+              </a:rPr>
+              <a:t> </a:t>
+            </a:r>
+            <a:r>
+              <a:rPr lang="nl-BE" dirty="0" err="1">
+                <a:latin typeface="Courier New" panose="02070309020205020404" pitchFamily="49" charset="0"/>
+                <a:cs typeface="Courier New" panose="02070309020205020404" pitchFamily="49" charset="0"/>
+              </a:rPr>
+              <a:t>part_counter</a:t>
+            </a:r>
+            <a:r>
+              <a:rPr lang="nl-BE" dirty="0">
+                <a:latin typeface="Courier New" panose="02070309020205020404" pitchFamily="49" charset="0"/>
+                <a:cs typeface="Courier New" panose="02070309020205020404" pitchFamily="49" charset="0"/>
+              </a:rPr>
+              <a:t> in counters:</a:t>
+            </a:r>
+          </a:p>
+          <a:p>
+            <a:r>
+              <a:rPr lang="nl-BE" dirty="0">
+                <a:latin typeface="Courier New" panose="02070309020205020404" pitchFamily="49" charset="0"/>
+                <a:cs typeface="Courier New" panose="02070309020205020404" pitchFamily="49" charset="0"/>
+              </a:rPr>
+              <a:t>        </a:t>
+            </a:r>
+            <a:r>
+              <a:rPr lang="nl-BE" dirty="0" err="1">
+                <a:latin typeface="Courier New" panose="02070309020205020404" pitchFamily="49" charset="0"/>
+                <a:cs typeface="Courier New" panose="02070309020205020404" pitchFamily="49" charset="0"/>
+              </a:rPr>
+              <a:t>for</a:t>
+            </a:r>
+            <a:r>
+              <a:rPr lang="nl-BE" dirty="0">
+                <a:latin typeface="Courier New" panose="02070309020205020404" pitchFamily="49" charset="0"/>
+                <a:cs typeface="Courier New" panose="02070309020205020404" pitchFamily="49" charset="0"/>
+              </a:rPr>
+              <a:t> </a:t>
+            </a:r>
+            <a:r>
+              <a:rPr lang="nl-BE" dirty="0" err="1">
+                <a:latin typeface="Courier New" panose="02070309020205020404" pitchFamily="49" charset="0"/>
+                <a:cs typeface="Courier New" panose="02070309020205020404" pitchFamily="49" charset="0"/>
+              </a:rPr>
+              <a:t>nucl</a:t>
+            </a:r>
+            <a:r>
+              <a:rPr lang="nl-BE" dirty="0">
+                <a:latin typeface="Courier New" panose="02070309020205020404" pitchFamily="49" charset="0"/>
+                <a:cs typeface="Courier New" panose="02070309020205020404" pitchFamily="49" charset="0"/>
+              </a:rPr>
+              <a:t> in </a:t>
+            </a:r>
+            <a:r>
+              <a:rPr lang="nl-BE" dirty="0" err="1">
+                <a:latin typeface="Courier New" panose="02070309020205020404" pitchFamily="49" charset="0"/>
+                <a:cs typeface="Courier New" panose="02070309020205020404" pitchFamily="49" charset="0"/>
+              </a:rPr>
+              <a:t>part_counter</a:t>
+            </a:r>
+            <a:r>
+              <a:rPr lang="nl-BE" dirty="0">
+                <a:latin typeface="Courier New" panose="02070309020205020404" pitchFamily="49" charset="0"/>
+                <a:cs typeface="Courier New" panose="02070309020205020404" pitchFamily="49" charset="0"/>
+              </a:rPr>
+              <a:t>:</a:t>
+            </a:r>
+          </a:p>
+          <a:p>
+            <a:r>
+              <a:rPr lang="nl-BE" dirty="0">
+                <a:latin typeface="Courier New" panose="02070309020205020404" pitchFamily="49" charset="0"/>
+                <a:cs typeface="Courier New" panose="02070309020205020404" pitchFamily="49" charset="0"/>
+              </a:rPr>
+              <a:t>            counter[</a:t>
+            </a:r>
+            <a:r>
+              <a:rPr lang="nl-BE" dirty="0" err="1">
+                <a:latin typeface="Courier New" panose="02070309020205020404" pitchFamily="49" charset="0"/>
+                <a:cs typeface="Courier New" panose="02070309020205020404" pitchFamily="49" charset="0"/>
+              </a:rPr>
+              <a:t>nucl</a:t>
+            </a:r>
+            <a:r>
+              <a:rPr lang="nl-BE" dirty="0">
+                <a:latin typeface="Courier New" panose="02070309020205020404" pitchFamily="49" charset="0"/>
+                <a:cs typeface="Courier New" panose="02070309020205020404" pitchFamily="49" charset="0"/>
+              </a:rPr>
+              <a:t>] += </a:t>
+            </a:r>
+            <a:r>
+              <a:rPr lang="nl-BE" dirty="0" err="1">
+                <a:latin typeface="Courier New" panose="02070309020205020404" pitchFamily="49" charset="0"/>
+                <a:cs typeface="Courier New" panose="02070309020205020404" pitchFamily="49" charset="0"/>
+              </a:rPr>
+              <a:t>part_counter</a:t>
+            </a:r>
+            <a:r>
+              <a:rPr lang="nl-BE" dirty="0">
+                <a:latin typeface="Courier New" panose="02070309020205020404" pitchFamily="49" charset="0"/>
+                <a:cs typeface="Courier New" panose="02070309020205020404" pitchFamily="49" charset="0"/>
+              </a:rPr>
+              <a:t>[</a:t>
+            </a:r>
+            <a:r>
+              <a:rPr lang="nl-BE" dirty="0" err="1">
+                <a:latin typeface="Courier New" panose="02070309020205020404" pitchFamily="49" charset="0"/>
+                <a:cs typeface="Courier New" panose="02070309020205020404" pitchFamily="49" charset="0"/>
+              </a:rPr>
+              <a:t>nucl</a:t>
+            </a:r>
+            <a:r>
+              <a:rPr lang="nl-BE" dirty="0">
+                <a:latin typeface="Courier New" panose="02070309020205020404" pitchFamily="49" charset="0"/>
+                <a:cs typeface="Courier New" panose="02070309020205020404" pitchFamily="49" charset="0"/>
+              </a:rPr>
+              <a:t>]</a:t>
+            </a:r>
+          </a:p>
+          <a:p>
+            <a:r>
+              <a:rPr lang="nl-BE" dirty="0">
+                <a:latin typeface="Courier New" panose="02070309020205020404" pitchFamily="49" charset="0"/>
+                <a:cs typeface="Courier New" panose="02070309020205020404" pitchFamily="49" charset="0"/>
+              </a:rPr>
+              <a:t>    return counter</a:t>
+            </a:r>
+            <a:endParaRPr lang="nl-BE" dirty="0" smtClean="0">
+              <a:latin typeface="Courier New" panose="02070309020205020404" pitchFamily="49" charset="0"/>
+              <a:cs typeface="Courier New" panose="02070309020205020404" pitchFamily="49" charset="0"/>
+            </a:endParaRPr>
+          </a:p>
+        </p:txBody>
+      </p:sp>
+      <p:grpSp>
+        <p:nvGrpSpPr>
+          <p:cNvPr id="5" name="Group 4"/>
+          <p:cNvGrpSpPr/>
+          <p:nvPr/>
+        </p:nvGrpSpPr>
+        <p:grpSpPr>
+          <a:xfrm>
+            <a:off x="154600" y="1981200"/>
+            <a:ext cx="2055200" cy="1250374"/>
+            <a:chOff x="5793400" y="2133600"/>
+            <a:chExt cx="2055200" cy="1250374"/>
+          </a:xfrm>
+        </p:grpSpPr>
+        <p:sp>
+          <p:nvSpPr>
+            <p:cNvPr id="6" name="TextBox 5"/>
+            <p:cNvSpPr txBox="1"/>
+            <p:nvPr/>
+          </p:nvSpPr>
+          <p:spPr>
+            <a:xfrm>
+              <a:off x="5793400" y="2133600"/>
+              <a:ext cx="1293200" cy="646331"/>
+            </a:xfrm>
+            <a:prstGeom prst="rect">
+              <a:avLst/>
+            </a:prstGeom>
+            <a:noFill/>
+            <a:ln>
+              <a:solidFill>
+                <a:schemeClr val="tx1"/>
+              </a:solidFill>
+            </a:ln>
+          </p:spPr>
+          <p:txBody>
+            <a:bodyPr wrap="square" rtlCol="0">
+              <a:spAutoFit/>
+            </a:bodyPr>
+            <a:lstStyle/>
+            <a:p>
+              <a:r>
+                <a:rPr lang="en-US" dirty="0" smtClean="0">
+                  <a:latin typeface="Courier New" panose="02070309020205020404" pitchFamily="49" charset="0"/>
+                  <a:cs typeface="Courier New" panose="02070309020205020404" pitchFamily="49" charset="0"/>
+                </a:rPr>
+                <a:t>tuple</a:t>
+              </a:r>
+              <a:r>
+                <a:rPr lang="en-US" dirty="0" smtClean="0"/>
+                <a:t>s as</a:t>
+              </a:r>
+              <a:br>
+                <a:rPr lang="en-US" dirty="0" smtClean="0"/>
+              </a:br>
+              <a:r>
+                <a:rPr lang="en-US" dirty="0" smtClean="0"/>
+                <a:t>input</a:t>
+              </a:r>
+              <a:endParaRPr lang="nl-BE" dirty="0"/>
+            </a:p>
+          </p:txBody>
+        </p:sp>
+        <p:cxnSp>
+          <p:nvCxnSpPr>
+            <p:cNvPr id="7" name="Straight Arrow Connector 6"/>
+            <p:cNvCxnSpPr>
+              <a:stCxn id="6" idx="3"/>
+            </p:cNvCxnSpPr>
+            <p:nvPr/>
+          </p:nvCxnSpPr>
+          <p:spPr>
+            <a:xfrm>
+              <a:off x="7086600" y="2456766"/>
+              <a:ext cx="762000" cy="927208"/>
+            </a:xfrm>
+            <a:prstGeom prst="straightConnector1">
+              <a:avLst/>
+            </a:prstGeom>
+            <a:ln w="12700">
+              <a:solidFill>
+                <a:schemeClr val="tx1"/>
+              </a:solidFill>
+              <a:tailEnd type="stealth" w="lg" len="lg"/>
+            </a:ln>
+          </p:spPr>
+          <p:style>
+            <a:lnRef idx="1">
+              <a:schemeClr val="accent1"/>
+            </a:lnRef>
+            <a:fillRef idx="0">
+              <a:schemeClr val="accent1"/>
+            </a:fillRef>
+            <a:effectRef idx="0">
+              <a:schemeClr val="accent1"/>
+            </a:effectRef>
+            <a:fontRef idx="minor">
+              <a:schemeClr val="tx1"/>
+            </a:fontRef>
+          </p:style>
+        </p:cxnSp>
+      </p:grpSp>
+      <p:grpSp>
+        <p:nvGrpSpPr>
+          <p:cNvPr id="11" name="Group 10"/>
+          <p:cNvGrpSpPr/>
+          <p:nvPr/>
+        </p:nvGrpSpPr>
+        <p:grpSpPr>
+          <a:xfrm>
+            <a:off x="152400" y="2819400"/>
+            <a:ext cx="2057400" cy="990600"/>
+            <a:chOff x="5791200" y="2362200"/>
+            <a:chExt cx="2057400" cy="990600"/>
+          </a:xfrm>
+        </p:grpSpPr>
+        <p:sp>
+          <p:nvSpPr>
+            <p:cNvPr id="12" name="TextBox 11"/>
+            <p:cNvSpPr txBox="1"/>
+            <p:nvPr/>
+          </p:nvSpPr>
+          <p:spPr>
+            <a:xfrm>
+              <a:off x="5791200" y="2362200"/>
+              <a:ext cx="1295400" cy="646331"/>
+            </a:xfrm>
+            <a:prstGeom prst="rect">
+              <a:avLst/>
+            </a:prstGeom>
+            <a:noFill/>
+            <a:ln>
+              <a:solidFill>
+                <a:schemeClr val="tx1"/>
+              </a:solidFill>
+            </a:ln>
+          </p:spPr>
+          <p:txBody>
+            <a:bodyPr wrap="square" rtlCol="0">
+              <a:spAutoFit/>
+            </a:bodyPr>
+            <a:lstStyle/>
+            <a:p>
+              <a:r>
+                <a:rPr lang="en-US" dirty="0" smtClean="0"/>
+                <a:t>pool of</a:t>
+              </a:r>
+              <a:br>
+                <a:rPr lang="en-US" dirty="0" smtClean="0"/>
+              </a:br>
+              <a:r>
+                <a:rPr lang="en-US" dirty="0" smtClean="0"/>
+                <a:t>processes</a:t>
+              </a:r>
+              <a:endParaRPr lang="nl-BE" dirty="0"/>
+            </a:p>
+          </p:txBody>
+        </p:sp>
+        <p:cxnSp>
+          <p:nvCxnSpPr>
+            <p:cNvPr id="13" name="Straight Arrow Connector 12"/>
+            <p:cNvCxnSpPr>
+              <a:stCxn id="12" idx="3"/>
+            </p:cNvCxnSpPr>
+            <p:nvPr/>
+          </p:nvCxnSpPr>
+          <p:spPr>
+            <a:xfrm>
+              <a:off x="7086600" y="2685366"/>
+              <a:ext cx="762000" cy="667434"/>
+            </a:xfrm>
+            <a:prstGeom prst="straightConnector1">
+              <a:avLst/>
+            </a:prstGeom>
+            <a:ln w="12700">
+              <a:solidFill>
+                <a:schemeClr val="tx1"/>
+              </a:solidFill>
+              <a:tailEnd type="stealth" w="lg" len="lg"/>
+            </a:ln>
+          </p:spPr>
+          <p:style>
+            <a:lnRef idx="1">
+              <a:schemeClr val="accent1"/>
+            </a:lnRef>
+            <a:fillRef idx="0">
+              <a:schemeClr val="accent1"/>
+            </a:fillRef>
+            <a:effectRef idx="0">
+              <a:schemeClr val="accent1"/>
+            </a:effectRef>
+            <a:fontRef idx="minor">
+              <a:schemeClr val="tx1"/>
+            </a:fontRef>
+          </p:style>
+        </p:cxnSp>
+      </p:grpSp>
+      <p:grpSp>
+        <p:nvGrpSpPr>
+          <p:cNvPr id="14" name="Group 13"/>
+          <p:cNvGrpSpPr/>
+          <p:nvPr/>
+        </p:nvGrpSpPr>
+        <p:grpSpPr>
+          <a:xfrm>
+            <a:off x="177390" y="3594910"/>
+            <a:ext cx="2032409" cy="646332"/>
+            <a:chOff x="5802115" y="2751823"/>
+            <a:chExt cx="2205368" cy="621371"/>
+          </a:xfrm>
+        </p:grpSpPr>
+        <p:sp>
+          <p:nvSpPr>
+            <p:cNvPr id="15" name="TextBox 14"/>
+            <p:cNvSpPr txBox="1"/>
+            <p:nvPr/>
+          </p:nvSpPr>
+          <p:spPr>
+            <a:xfrm>
+              <a:off x="5802115" y="2751823"/>
+              <a:ext cx="1378523" cy="621371"/>
+            </a:xfrm>
+            <a:prstGeom prst="rect">
+              <a:avLst/>
+            </a:prstGeom>
+            <a:noFill/>
+            <a:ln>
+              <a:solidFill>
+                <a:schemeClr val="tx1"/>
+              </a:solidFill>
+            </a:ln>
+          </p:spPr>
+          <p:txBody>
+            <a:bodyPr wrap="square" rtlCol="0">
+              <a:spAutoFit/>
+            </a:bodyPr>
+            <a:lstStyle/>
+            <a:p>
+              <a:r>
+                <a:rPr lang="en-US" dirty="0" smtClean="0"/>
+                <a:t>concurrent</a:t>
+              </a:r>
+              <a:br>
+                <a:rPr lang="en-US" dirty="0" smtClean="0"/>
+              </a:br>
+              <a:r>
+                <a:rPr lang="en-US" dirty="0" smtClean="0"/>
+                <a:t>processing</a:t>
+              </a:r>
+              <a:endParaRPr lang="nl-BE" dirty="0"/>
+            </a:p>
+          </p:txBody>
+        </p:sp>
+        <p:cxnSp>
+          <p:nvCxnSpPr>
+            <p:cNvPr id="16" name="Straight Arrow Connector 15"/>
+            <p:cNvCxnSpPr>
+              <a:stCxn id="15" idx="3"/>
+            </p:cNvCxnSpPr>
+            <p:nvPr/>
+          </p:nvCxnSpPr>
+          <p:spPr>
+            <a:xfrm>
+              <a:off x="7180638" y="3062509"/>
+              <a:ext cx="826845" cy="189129"/>
+            </a:xfrm>
+            <a:prstGeom prst="straightConnector1">
+              <a:avLst/>
+            </a:prstGeom>
+            <a:ln w="12700">
+              <a:solidFill>
+                <a:schemeClr val="tx1"/>
+              </a:solidFill>
+              <a:tailEnd type="stealth" w="lg" len="lg"/>
+            </a:ln>
+          </p:spPr>
+          <p:style>
+            <a:lnRef idx="1">
+              <a:schemeClr val="accent1"/>
+            </a:lnRef>
+            <a:fillRef idx="0">
+              <a:schemeClr val="accent1"/>
+            </a:fillRef>
+            <a:effectRef idx="0">
+              <a:schemeClr val="accent1"/>
+            </a:effectRef>
+            <a:fontRef idx="minor">
+              <a:schemeClr val="tx1"/>
+            </a:fontRef>
+          </p:style>
+        </p:cxnSp>
+      </p:grpSp>
+      <p:grpSp>
+        <p:nvGrpSpPr>
+          <p:cNvPr id="43" name="Group 42"/>
+          <p:cNvGrpSpPr/>
+          <p:nvPr/>
+        </p:nvGrpSpPr>
+        <p:grpSpPr>
+          <a:xfrm>
+            <a:off x="152400" y="4325034"/>
+            <a:ext cx="2060274" cy="1085165"/>
+            <a:chOff x="457200" y="4325034"/>
+            <a:chExt cx="2060274" cy="1085165"/>
+          </a:xfrm>
+        </p:grpSpPr>
+        <p:grpSp>
+          <p:nvGrpSpPr>
+            <p:cNvPr id="19" name="Group 18"/>
+            <p:cNvGrpSpPr/>
+            <p:nvPr/>
+          </p:nvGrpSpPr>
+          <p:grpSpPr>
+            <a:xfrm>
+              <a:off x="457200" y="4546123"/>
+              <a:ext cx="1828800" cy="646331"/>
+              <a:chOff x="5733524" y="2594677"/>
+              <a:chExt cx="1984432" cy="888963"/>
+            </a:xfrm>
+          </p:grpSpPr>
+          <p:sp>
+            <p:nvSpPr>
+              <p:cNvPr id="20" name="TextBox 19"/>
+              <p:cNvSpPr txBox="1"/>
+              <p:nvPr/>
+            </p:nvSpPr>
+            <p:spPr>
+              <a:xfrm>
+                <a:off x="5733524" y="2594677"/>
+                <a:ext cx="1405638" cy="888963"/>
+              </a:xfrm>
+              <a:prstGeom prst="rect">
+                <a:avLst/>
+              </a:prstGeom>
+              <a:noFill/>
+              <a:ln>
+                <a:solidFill>
+                  <a:schemeClr val="tx1"/>
+                </a:solidFill>
+              </a:ln>
+            </p:spPr>
+            <p:txBody>
+              <a:bodyPr wrap="square" rtlCol="0">
+                <a:spAutoFit/>
+              </a:bodyPr>
+              <a:lstStyle/>
+              <a:p>
+                <a:r>
+                  <a:rPr lang="en-US" dirty="0" smtClean="0"/>
+                  <a:t>aggregating</a:t>
+                </a:r>
+                <a:br>
+                  <a:rPr lang="en-US" dirty="0" smtClean="0"/>
+                </a:br>
+                <a:r>
+                  <a:rPr lang="en-US" dirty="0" smtClean="0"/>
+                  <a:t>results</a:t>
+                </a:r>
+                <a:endParaRPr lang="nl-BE" dirty="0"/>
+              </a:p>
+            </p:txBody>
+          </p:sp>
+          <p:cxnSp>
+            <p:nvCxnSpPr>
+              <p:cNvPr id="21" name="Straight Arrow Connector 20"/>
+              <p:cNvCxnSpPr>
+                <a:stCxn id="20" idx="3"/>
+                <a:endCxn id="40" idx="1"/>
+              </p:cNvCxnSpPr>
+              <p:nvPr/>
+            </p:nvCxnSpPr>
+            <p:spPr>
+              <a:xfrm flipV="1">
+                <a:off x="7139162" y="3036860"/>
+                <a:ext cx="578794" cy="2300"/>
+              </a:xfrm>
+              <a:prstGeom prst="straightConnector1">
+                <a:avLst/>
+              </a:prstGeom>
+              <a:ln w="12700">
+                <a:solidFill>
+                  <a:schemeClr val="tx1"/>
+                </a:solidFill>
+                <a:tailEnd type="stealth" w="lg" len="lg"/>
+              </a:ln>
+            </p:spPr>
+            <p:style>
+              <a:lnRef idx="1">
+                <a:schemeClr val="accent1"/>
+              </a:lnRef>
+              <a:fillRef idx="0">
+                <a:schemeClr val="accent1"/>
+              </a:fillRef>
+              <a:effectRef idx="0">
+                <a:schemeClr val="accent1"/>
+              </a:effectRef>
+              <a:fontRef idx="minor">
+                <a:schemeClr val="tx1"/>
+              </a:fontRef>
+            </p:style>
+          </p:cxnSp>
+        </p:grpSp>
+        <p:sp>
+          <p:nvSpPr>
+            <p:cNvPr id="40" name="Left Brace 39"/>
+            <p:cNvSpPr/>
+            <p:nvPr/>
+          </p:nvSpPr>
+          <p:spPr>
+            <a:xfrm>
+              <a:off x="2286000" y="4325034"/>
+              <a:ext cx="231474" cy="1085165"/>
+            </a:xfrm>
+            <a:prstGeom prst="leftBrace">
+              <a:avLst/>
+            </a:prstGeom>
+            <a:ln>
+              <a:solidFill>
+                <a:schemeClr val="tx1"/>
+              </a:solidFill>
+            </a:ln>
+          </p:spPr>
+          <p:style>
+            <a:lnRef idx="1">
+              <a:schemeClr val="accent1"/>
+            </a:lnRef>
+            <a:fillRef idx="0">
+              <a:schemeClr val="accent1"/>
+            </a:fillRef>
+            <a:effectRef idx="0">
+              <a:schemeClr val="accent1"/>
+            </a:effectRef>
+            <a:fontRef idx="minor">
+              <a:schemeClr val="tx1"/>
+            </a:fontRef>
+          </p:style>
+          <p:txBody>
+            <a:bodyPr rtlCol="0" anchor="ctr"/>
+            <a:lstStyle/>
+            <a:p>
+              <a:pPr algn="ctr"/>
+              <a:endParaRPr lang="nl-BE"/>
+            </a:p>
+          </p:txBody>
+        </p:sp>
+      </p:grpSp>
+      <p:grpSp>
+        <p:nvGrpSpPr>
+          <p:cNvPr id="44" name="Group 43"/>
+          <p:cNvGrpSpPr/>
+          <p:nvPr/>
+        </p:nvGrpSpPr>
+        <p:grpSpPr>
+          <a:xfrm>
+            <a:off x="7239000" y="1840468"/>
+            <a:ext cx="1752600" cy="1893332"/>
+            <a:chOff x="5371108" y="2635746"/>
+            <a:chExt cx="1752600" cy="1893332"/>
+          </a:xfrm>
+        </p:grpSpPr>
+        <p:sp>
+          <p:nvSpPr>
+            <p:cNvPr id="45" name="TextBox 44"/>
+            <p:cNvSpPr txBox="1"/>
+            <p:nvPr/>
+          </p:nvSpPr>
+          <p:spPr>
+            <a:xfrm>
+              <a:off x="5486400" y="2635746"/>
+              <a:ext cx="1637308" cy="369332"/>
+            </a:xfrm>
+            <a:prstGeom prst="rect">
+              <a:avLst/>
+            </a:prstGeom>
+            <a:solidFill>
+              <a:schemeClr val="bg1"/>
+            </a:solidFill>
+            <a:ln>
+              <a:solidFill>
+                <a:schemeClr val="tx1"/>
+              </a:solidFill>
+            </a:ln>
+          </p:spPr>
+          <p:txBody>
+            <a:bodyPr wrap="none" rtlCol="0">
+              <a:spAutoFit/>
+            </a:bodyPr>
+            <a:lstStyle/>
+            <a:p>
+              <a:r>
+                <a:rPr lang="en-US" dirty="0" err="1" smtClean="0">
+                  <a:cs typeface="Courier New" panose="02070309020205020404" pitchFamily="49" charset="0"/>
+                </a:rPr>
+                <a:t>nr</a:t>
+              </a:r>
+              <a:r>
+                <a:rPr lang="en-US" dirty="0" smtClean="0">
+                  <a:cs typeface="Courier New" panose="02070309020205020404" pitchFamily="49" charset="0"/>
+                </a:rPr>
+                <a:t>. of processes</a:t>
+              </a:r>
+              <a:endParaRPr lang="nl-BE" dirty="0"/>
+            </a:p>
+          </p:txBody>
+        </p:sp>
+        <p:cxnSp>
+          <p:nvCxnSpPr>
+            <p:cNvPr id="46" name="Straight Arrow Connector 45"/>
+            <p:cNvCxnSpPr>
+              <a:stCxn id="45" idx="2"/>
+            </p:cNvCxnSpPr>
+            <p:nvPr/>
+          </p:nvCxnSpPr>
+          <p:spPr>
+            <a:xfrm flipH="1">
+              <a:off x="5371108" y="3005078"/>
+              <a:ext cx="933946" cy="1524000"/>
+            </a:xfrm>
+            <a:prstGeom prst="straightConnector1">
+              <a:avLst/>
+            </a:prstGeom>
+            <a:ln w="12700">
+              <a:solidFill>
+                <a:schemeClr val="tx1"/>
+              </a:solidFill>
+              <a:tailEnd type="stealth" w="lg" len="lg"/>
+            </a:ln>
+          </p:spPr>
+          <p:style>
+            <a:lnRef idx="1">
+              <a:schemeClr val="accent1"/>
+            </a:lnRef>
+            <a:fillRef idx="0">
+              <a:schemeClr val="accent1"/>
+            </a:fillRef>
+            <a:effectRef idx="0">
+              <a:schemeClr val="accent1"/>
+            </a:effectRef>
+            <a:fontRef idx="minor">
+              <a:schemeClr val="tx1"/>
+            </a:fontRef>
+          </p:style>
+        </p:cxnSp>
+      </p:grpSp>
+    </p:spTree>
+    <p:extLst>
+      <p:ext uri="{BB962C8B-B14F-4D97-AF65-F5344CB8AC3E}">
+        <p14:creationId xmlns:p14="http://schemas.microsoft.com/office/powerpoint/2010/main" val="4239114519"/>
+      </p:ext>
+    </p:extLst>
+  </p:cSld>
+  <p:clrMapOvr>
+    <a:masterClrMapping/>
+  </p:clrMapOvr>
+  <p:timing>
+    <p:tnLst>
+      <p:par>
+        <p:cTn id="1" dur="indefinite" restart="never" nodeType="tmRoot">
+          <p:childTnLst>
+            <p:seq concurrent="1" nextAc="seek">
+              <p:cTn id="2" dur="indefinite" nodeType="mainSeq">
+                <p:childTnLst>
+                  <p:par>
+                    <p:cTn id="3" fill="hold">
+                      <p:stCondLst>
+                        <p:cond delay="indefinite"/>
+                      </p:stCondLst>
+                      <p:childTnLst>
+                        <p:par>
+                          <p:cTn id="4" fill="hold">
+                            <p:stCondLst>
+                              <p:cond delay="0"/>
+                            </p:stCondLst>
+                            <p:childTnLst>
+                              <p:par>
+                                <p:cTn id="5" presetID="1" presetClass="entr" presetSubtype="0" fill="hold" nodeType="clickEffect">
+                                  <p:stCondLst>
+                                    <p:cond delay="0"/>
+                                  </p:stCondLst>
+                                  <p:childTnLst>
+                                    <p:set>
+                                      <p:cBhvr>
+                                        <p:cTn id="6" dur="1" fill="hold">
+                                          <p:stCondLst>
+                                            <p:cond delay="0"/>
+                                          </p:stCondLst>
+                                        </p:cTn>
+                                        <p:tgtEl>
+                                          <p:spTgt spid="5"/>
+                                        </p:tgtEl>
+                                        <p:attrNameLst>
+                                          <p:attrName>style.visibility</p:attrName>
+                                        </p:attrNameLst>
+                                      </p:cBhvr>
+                                      <p:to>
+                                        <p:strVal val="visible"/>
+                                      </p:to>
+                                    </p:set>
+                                  </p:childTnLst>
+                                </p:cTn>
+                              </p:par>
+                            </p:childTnLst>
+                          </p:cTn>
+                        </p:par>
+                      </p:childTnLst>
+                    </p:cTn>
+                  </p:par>
+                  <p:par>
+                    <p:cTn id="7" fill="hold">
+                      <p:stCondLst>
+                        <p:cond delay="indefinite"/>
+                      </p:stCondLst>
+                      <p:childTnLst>
+                        <p:par>
+                          <p:cTn id="8" fill="hold">
+                            <p:stCondLst>
+                              <p:cond delay="0"/>
+                            </p:stCondLst>
+                            <p:childTnLst>
+                              <p:par>
+                                <p:cTn id="9" presetID="1" presetClass="entr" presetSubtype="0" fill="hold" nodeType="clickEffect">
+                                  <p:stCondLst>
+                                    <p:cond delay="0"/>
+                                  </p:stCondLst>
+                                  <p:childTnLst>
+                                    <p:set>
+                                      <p:cBhvr>
+                                        <p:cTn id="10" dur="1" fill="hold">
+                                          <p:stCondLst>
+                                            <p:cond delay="0"/>
+                                          </p:stCondLst>
+                                        </p:cTn>
+                                        <p:tgtEl>
+                                          <p:spTgt spid="11"/>
+                                        </p:tgtEl>
+                                        <p:attrNameLst>
+                                          <p:attrName>style.visibility</p:attrName>
+                                        </p:attrNameLst>
+                                      </p:cBhvr>
+                                      <p:to>
+                                        <p:strVal val="visible"/>
+                                      </p:to>
+                                    </p:set>
+                                  </p:childTnLst>
+                                </p:cTn>
+                              </p:par>
+                            </p:childTnLst>
+                          </p:cTn>
+                        </p:par>
+                      </p:childTnLst>
+                    </p:cTn>
+                  </p:par>
+                  <p:par>
+                    <p:cTn id="11" fill="hold">
+                      <p:stCondLst>
+                        <p:cond delay="indefinite"/>
+                      </p:stCondLst>
+                      <p:childTnLst>
+                        <p:par>
+                          <p:cTn id="12" fill="hold">
+                            <p:stCondLst>
+                              <p:cond delay="0"/>
+                            </p:stCondLst>
+                            <p:childTnLst>
+                              <p:par>
+                                <p:cTn id="13" presetID="1" presetClass="entr" presetSubtype="0" fill="hold" nodeType="clickEffect">
+                                  <p:stCondLst>
+                                    <p:cond delay="0"/>
+                                  </p:stCondLst>
+                                  <p:childTnLst>
+                                    <p:set>
+                                      <p:cBhvr>
+                                        <p:cTn id="14" dur="1" fill="hold">
+                                          <p:stCondLst>
+                                            <p:cond delay="0"/>
+                                          </p:stCondLst>
+                                        </p:cTn>
+                                        <p:tgtEl>
+                                          <p:spTgt spid="44"/>
+                                        </p:tgtEl>
+                                        <p:attrNameLst>
+                                          <p:attrName>style.visibility</p:attrName>
+                                        </p:attrNameLst>
+                                      </p:cBhvr>
+                                      <p:to>
+                                        <p:strVal val="visible"/>
+                                      </p:to>
+                                    </p:set>
+                                  </p:childTnLst>
+                                </p:cTn>
+                              </p:par>
+                            </p:childTnLst>
+                          </p:cTn>
+                        </p:par>
+                      </p:childTnLst>
+                    </p:cTn>
+                  </p:par>
+                  <p:par>
+                    <p:cTn id="15" fill="hold">
+                      <p:stCondLst>
+                        <p:cond delay="indefinite"/>
+                      </p:stCondLst>
+                      <p:childTnLst>
+                        <p:par>
+                          <p:cTn id="16" fill="hold">
+                            <p:stCondLst>
+                              <p:cond delay="0"/>
+                            </p:stCondLst>
+                            <p:childTnLst>
+                              <p:par>
+                                <p:cTn id="17" presetID="1" presetClass="entr" presetSubtype="0" fill="hold" nodeType="clickEffect">
+                                  <p:stCondLst>
+                                    <p:cond delay="0"/>
+                                  </p:stCondLst>
+                                  <p:childTnLst>
+                                    <p:set>
+                                      <p:cBhvr>
+                                        <p:cTn id="18" dur="1" fill="hold">
+                                          <p:stCondLst>
+                                            <p:cond delay="0"/>
+                                          </p:stCondLst>
+                                        </p:cTn>
+                                        <p:tgtEl>
+                                          <p:spTgt spid="14"/>
+                                        </p:tgtEl>
+                                        <p:attrNameLst>
+                                          <p:attrName>style.visibility</p:attrName>
+                                        </p:attrNameLst>
+                                      </p:cBhvr>
+                                      <p:to>
+                                        <p:strVal val="visible"/>
+                                      </p:to>
+                                    </p:set>
+                                  </p:childTnLst>
+                                </p:cTn>
+                              </p:par>
+                            </p:childTnLst>
+                          </p:cTn>
+                        </p:par>
+                      </p:childTnLst>
+                    </p:cTn>
+                  </p:par>
+                  <p:par>
+                    <p:cTn id="19" fill="hold">
+                      <p:stCondLst>
+                        <p:cond delay="indefinite"/>
+                      </p:stCondLst>
+                      <p:childTnLst>
+                        <p:par>
+                          <p:cTn id="20" fill="hold">
+                            <p:stCondLst>
+                              <p:cond delay="0"/>
+                            </p:stCondLst>
+                            <p:childTnLst>
+                              <p:par>
+                                <p:cTn id="21" presetID="1" presetClass="entr" presetSubtype="0" fill="hold" nodeType="clickEffect">
+                                  <p:stCondLst>
+                                    <p:cond delay="0"/>
+                                  </p:stCondLst>
+                                  <p:childTnLst>
+                                    <p:set>
+                                      <p:cBhvr>
+                                        <p:cTn id="22" dur="1" fill="hold">
+                                          <p:stCondLst>
+                                            <p:cond delay="0"/>
+                                          </p:stCondLst>
+                                        </p:cTn>
+                                        <p:tgtEl>
+                                          <p:spTgt spid="43"/>
+                                        </p:tgtEl>
+                                        <p:attrNameLst>
+                                          <p:attrName>style.visibility</p:attrName>
+                                        </p:attrNameLst>
+                                      </p:cBhvr>
+                                      <p:to>
+                                        <p:strVal val="visible"/>
+                                      </p:to>
+                                    </p:set>
+                                  </p:childTnLst>
+                                </p:cTn>
+                              </p:par>
+                            </p:childTnLst>
+                          </p:cTn>
+                        </p:par>
+                      </p:childTnLst>
+                    </p:cTn>
+                  </p:par>
+                </p:childTnLst>
+              </p:cTn>
+              <p:prevCondLst>
+                <p:cond evt="onPrev" delay="0">
+                  <p:tgtEl>
+                    <p:sldTgt/>
+                  </p:tgtEl>
+                </p:cond>
+              </p:prevCondLst>
+              <p:nextCondLst>
+                <p:cond evt="onNext" delay="0">
+                  <p:tgtEl>
+                    <p:sldTgt/>
+                  </p:tgtEl>
+                </p:cond>
+              </p:nextCondLst>
+            </p:seq>
+          </p:childTnLst>
+        </p:cTn>
+      </p:par>
+    </p:tnLst>
+  </p:timing>
+</p:sld>
+</file>
+
+<file path=ppt/slides/slide11.xml><?xml version="1.0" encoding="utf-8"?>
+<p:sld xmlns:a="http://schemas.openxmlformats.org/drawingml/2006/main" xmlns:r="http://schemas.openxmlformats.org/officeDocument/2006/relationships" xmlns:p="http://schemas.openxmlformats.org/presentationml/2006/main">
+  <p:cSld>
+    <p:spTree>
+      <p:nvGrpSpPr>
+        <p:cNvPr id="1" name=""/>
+        <p:cNvGrpSpPr/>
+        <p:nvPr/>
+      </p:nvGrpSpPr>
+      <p:grpSpPr>
+        <a:xfrm>
+          <a:off x="0" y="0"/>
+          <a:ext cx="0" cy="0"/>
+          <a:chOff x="0" y="0"/>
+          <a:chExt cx="0" cy="0"/>
+        </a:xfrm>
+      </p:grpSpPr>
+      <p:sp>
+        <p:nvSpPr>
+          <p:cNvPr id="2" name="Title 1"/>
+          <p:cNvSpPr>
+            <a:spLocks noGrp="1"/>
+          </p:cNvSpPr>
+          <p:nvPr>
+            <p:ph type="title"/>
+          </p:nvPr>
+        </p:nvSpPr>
+        <p:spPr/>
+        <p:txBody>
+          <a:bodyPr/>
+          <a:lstStyle/>
+          <a:p>
+            <a:r>
+              <a:rPr lang="en-US" dirty="0" smtClean="0"/>
+              <a:t>futures</a:t>
+            </a:r>
+            <a:endParaRPr lang="nl-BE" dirty="0"/>
+          </a:p>
+        </p:txBody>
+      </p:sp>
+      <p:sp>
+        <p:nvSpPr>
+          <p:cNvPr id="3" name="Text Placeholder 2"/>
+          <p:cNvSpPr>
+            <a:spLocks noGrp="1"/>
+          </p:cNvSpPr>
+          <p:nvPr>
+            <p:ph type="body" idx="1"/>
+          </p:nvPr>
+        </p:nvSpPr>
+        <p:spPr/>
+        <p:txBody>
+          <a:bodyPr/>
+          <a:lstStyle/>
+          <a:p>
+            <a:endParaRPr lang="nl-BE"/>
+          </a:p>
+        </p:txBody>
+      </p:sp>
+    </p:spTree>
+    <p:extLst>
+      <p:ext uri="{BB962C8B-B14F-4D97-AF65-F5344CB8AC3E}">
+        <p14:creationId xmlns:p14="http://schemas.microsoft.com/office/powerpoint/2010/main" val="3962184908"/>
       </p:ext>
     </p:extLst>
   </p:cSld>
@@ -6178,6 +7735,13 @@
   <p:clrMapOvr>
     <a:masterClrMapping/>
   </p:clrMapOvr>
+  <p:timing>
+    <p:tnLst>
+      <p:par>
+        <p:cTn id="1" dur="indefinite" restart="never" nodeType="tmRoot"/>
+      </p:par>
+    </p:tnLst>
+  </p:timing>
 </p:sld>
 </file>
 
@@ -6215,7 +7779,7 @@
           <a:p>
             <a:r>
               <a:rPr lang="en-US" dirty="0" smtClean="0"/>
-              <a:t>futures</a:t>
+              <a:t>Example</a:t>
             </a:r>
             <a:endParaRPr lang="nl-BE" dirty="0"/>
           </a:p>
@@ -6223,12 +7787,12 @@
       </p:sp>
       <p:sp>
         <p:nvSpPr>
-          <p:cNvPr id="3" name="Text Placeholder 2"/>
+          <p:cNvPr id="3" name="Content Placeholder 2"/>
           <p:cNvSpPr>
             <a:spLocks noGrp="1"/>
           </p:cNvSpPr>
           <p:nvPr>
-            <p:ph type="body" idx="1"/>
+            <p:ph idx="1"/>
           </p:nvPr>
         </p:nvSpPr>
         <p:spPr/>
@@ -6236,20 +7800,1506 @@
           <a:bodyPr/>
           <a:lstStyle/>
           <a:p>
-            <a:endParaRPr lang="nl-BE"/>
+            <a:r>
+              <a:rPr lang="en-US" dirty="0" smtClean="0"/>
+              <a:t>Count nucleotides in DNA sequence:</a:t>
+            </a:r>
+            <a:br>
+              <a:rPr lang="en-US" dirty="0" smtClean="0"/>
+            </a:br>
+            <a:r>
+              <a:rPr lang="en-US" dirty="0" smtClean="0"/>
+              <a:t>how many </a:t>
+            </a:r>
+            <a:r>
+              <a:rPr lang="en-US" dirty="0" smtClean="0">
+                <a:latin typeface="Courier New" panose="02070309020205020404" pitchFamily="49" charset="0"/>
+                <a:cs typeface="Courier New" panose="02070309020205020404" pitchFamily="49" charset="0"/>
+              </a:rPr>
+              <a:t>A</a:t>
+            </a:r>
+            <a:r>
+              <a:rPr lang="en-US" dirty="0" smtClean="0"/>
+              <a:t>, </a:t>
+            </a:r>
+            <a:r>
+              <a:rPr lang="en-US" dirty="0" smtClean="0">
+                <a:latin typeface="Courier New" panose="02070309020205020404" pitchFamily="49" charset="0"/>
+                <a:cs typeface="Courier New" panose="02070309020205020404" pitchFamily="49" charset="0"/>
+              </a:rPr>
+              <a:t>C</a:t>
+            </a:r>
+            <a:r>
+              <a:rPr lang="en-US" dirty="0" smtClean="0"/>
+              <a:t>, </a:t>
+            </a:r>
+            <a:r>
+              <a:rPr lang="en-US" dirty="0" smtClean="0">
+                <a:latin typeface="Courier New" panose="02070309020205020404" pitchFamily="49" charset="0"/>
+                <a:cs typeface="Courier New" panose="02070309020205020404" pitchFamily="49" charset="0"/>
+              </a:rPr>
+              <a:t>G</a:t>
+            </a:r>
+            <a:r>
+              <a:rPr lang="en-US" dirty="0" smtClean="0"/>
+              <a:t>, </a:t>
+            </a:r>
+            <a:r>
+              <a:rPr lang="en-US" dirty="0" smtClean="0">
+                <a:latin typeface="Courier New" panose="02070309020205020404" pitchFamily="49" charset="0"/>
+                <a:cs typeface="Courier New" panose="02070309020205020404" pitchFamily="49" charset="0"/>
+              </a:rPr>
+              <a:t>T</a:t>
+            </a:r>
+            <a:endParaRPr lang="nl-BE" dirty="0">
+              <a:latin typeface="Courier New" panose="02070309020205020404" pitchFamily="49" charset="0"/>
+              <a:cs typeface="Courier New" panose="02070309020205020404" pitchFamily="49" charset="0"/>
+            </a:endParaRPr>
           </a:p>
         </p:txBody>
       </p:sp>
+      <p:sp>
+        <p:nvSpPr>
+          <p:cNvPr id="4" name="TextBox 3"/>
+          <p:cNvSpPr txBox="1"/>
+          <p:nvPr/>
+        </p:nvSpPr>
+        <p:spPr>
+          <a:xfrm>
+            <a:off x="2620769" y="3429000"/>
+            <a:ext cx="2941831" cy="1200329"/>
+          </a:xfrm>
+          <a:prstGeom prst="rect">
+            <a:avLst/>
+          </a:prstGeom>
+          <a:solidFill>
+            <a:schemeClr val="accent3">
+              <a:lumMod val="40000"/>
+              <a:lumOff val="60000"/>
+            </a:schemeClr>
+          </a:solidFill>
+          <a:ln>
+            <a:solidFill>
+              <a:schemeClr val="tx1"/>
+            </a:solidFill>
+          </a:ln>
+        </p:spPr>
+        <p:txBody>
+          <a:bodyPr wrap="none" rtlCol="0">
+            <a:spAutoFit/>
+          </a:bodyPr>
+          <a:lstStyle/>
+          <a:p>
+            <a:r>
+              <a:rPr lang="nl-BE" dirty="0">
+                <a:latin typeface="Courier New" panose="02070309020205020404" pitchFamily="49" charset="0"/>
+                <a:cs typeface="Courier New" panose="02070309020205020404" pitchFamily="49" charset="0"/>
+              </a:rPr>
+              <a:t>AGTCATCCAAGTGGTGATAT</a:t>
+            </a:r>
+          </a:p>
+          <a:p>
+            <a:r>
+              <a:rPr lang="nl-BE" dirty="0">
+                <a:latin typeface="Courier New" panose="02070309020205020404" pitchFamily="49" charset="0"/>
+                <a:cs typeface="Courier New" panose="02070309020205020404" pitchFamily="49" charset="0"/>
+              </a:rPr>
+              <a:t>TATTGCCGGCGAGTAACTAT</a:t>
+            </a:r>
+          </a:p>
+          <a:p>
+            <a:r>
+              <a:rPr lang="nl-BE" dirty="0">
+                <a:latin typeface="Courier New" panose="02070309020205020404" pitchFamily="49" charset="0"/>
+                <a:cs typeface="Courier New" panose="02070309020205020404" pitchFamily="49" charset="0"/>
+              </a:rPr>
+              <a:t>CGATCTTAGACATCTGTATT</a:t>
+            </a:r>
+          </a:p>
+          <a:p>
+            <a:r>
+              <a:rPr lang="nl-BE" dirty="0" smtClean="0">
+                <a:latin typeface="Courier New" panose="02070309020205020404" pitchFamily="49" charset="0"/>
+                <a:cs typeface="Courier New" panose="02070309020205020404" pitchFamily="49" charset="0"/>
+              </a:rPr>
+              <a:t>AAGAGAAGTTACTAGCGGGA</a:t>
+            </a:r>
+            <a:endParaRPr lang="nl-BE" dirty="0">
+              <a:latin typeface="Courier New" panose="02070309020205020404" pitchFamily="49" charset="0"/>
+              <a:cs typeface="Courier New" panose="02070309020205020404" pitchFamily="49" charset="0"/>
+            </a:endParaRPr>
+          </a:p>
+        </p:txBody>
+      </p:sp>
+      <p:grpSp>
+        <p:nvGrpSpPr>
+          <p:cNvPr id="23" name="Group 22"/>
+          <p:cNvGrpSpPr/>
+          <p:nvPr/>
+        </p:nvGrpSpPr>
+        <p:grpSpPr>
+          <a:xfrm>
+            <a:off x="990600" y="2667000"/>
+            <a:ext cx="1871930" cy="2667000"/>
+            <a:chOff x="990600" y="2667000"/>
+            <a:chExt cx="1871930" cy="2667000"/>
+          </a:xfrm>
+        </p:grpSpPr>
+        <p:grpSp>
+          <p:nvGrpSpPr>
+            <p:cNvPr id="9" name="Group 8"/>
+            <p:cNvGrpSpPr/>
+            <p:nvPr/>
+          </p:nvGrpSpPr>
+          <p:grpSpPr>
+            <a:xfrm>
+              <a:off x="1524000" y="2667000"/>
+              <a:ext cx="1338530" cy="1066800"/>
+              <a:chOff x="1524000" y="2667000"/>
+              <a:chExt cx="1338530" cy="1066800"/>
+            </a:xfrm>
+          </p:grpSpPr>
+          <p:sp>
+            <p:nvSpPr>
+              <p:cNvPr id="5" name="TextBox 4"/>
+              <p:cNvSpPr txBox="1"/>
+              <p:nvPr/>
+            </p:nvSpPr>
+            <p:spPr>
+              <a:xfrm>
+                <a:off x="1524000" y="2667000"/>
+                <a:ext cx="1064202" cy="369332"/>
+              </a:xfrm>
+              <a:prstGeom prst="rect">
+                <a:avLst/>
+              </a:prstGeom>
+              <a:solidFill>
+                <a:schemeClr val="bg1"/>
+              </a:solidFill>
+              <a:ln>
+                <a:solidFill>
+                  <a:schemeClr val="tx1"/>
+                </a:solidFill>
+              </a:ln>
+            </p:spPr>
+            <p:txBody>
+              <a:bodyPr wrap="none" rtlCol="0">
+                <a:spAutoFit/>
+              </a:bodyPr>
+              <a:lstStyle/>
+              <a:p>
+                <a:r>
+                  <a:rPr lang="en-US" dirty="0" smtClean="0"/>
+                  <a:t>Process 0</a:t>
+                </a:r>
+                <a:endParaRPr lang="nl-BE" dirty="0"/>
+              </a:p>
+            </p:txBody>
+          </p:sp>
+          <p:sp>
+            <p:nvSpPr>
+              <p:cNvPr id="6" name="Rectangle 5"/>
+              <p:cNvSpPr/>
+              <p:nvPr/>
+            </p:nvSpPr>
+            <p:spPr>
+              <a:xfrm>
+                <a:off x="2710130" y="3429000"/>
+                <a:ext cx="152400" cy="304800"/>
+              </a:xfrm>
+              <a:prstGeom prst="rect">
+                <a:avLst/>
+              </a:prstGeom>
+              <a:noFill/>
+              <a:ln>
+                <a:solidFill>
+                  <a:schemeClr val="tx1"/>
+                </a:solidFill>
+              </a:ln>
+            </p:spPr>
+            <p:style>
+              <a:lnRef idx="2">
+                <a:schemeClr val="accent1">
+                  <a:shade val="50000"/>
+                </a:schemeClr>
+              </a:lnRef>
+              <a:fillRef idx="1">
+                <a:schemeClr val="accent1"/>
+              </a:fillRef>
+              <a:effectRef idx="0">
+                <a:schemeClr val="accent1"/>
+              </a:effectRef>
+              <a:fontRef idx="minor">
+                <a:schemeClr val="lt1"/>
+              </a:fontRef>
+            </p:style>
+            <p:txBody>
+              <a:bodyPr rtlCol="0" anchor="ctr"/>
+              <a:lstStyle/>
+              <a:p>
+                <a:pPr algn="ctr"/>
+                <a:endParaRPr lang="nl-BE"/>
+              </a:p>
+            </p:txBody>
+          </p:sp>
+          <p:cxnSp>
+            <p:nvCxnSpPr>
+              <p:cNvPr id="8" name="Straight Arrow Connector 7"/>
+              <p:cNvCxnSpPr>
+                <a:stCxn id="5" idx="2"/>
+                <a:endCxn id="6" idx="1"/>
+              </p:cNvCxnSpPr>
+              <p:nvPr/>
+            </p:nvCxnSpPr>
+            <p:spPr>
+              <a:xfrm>
+                <a:off x="2056101" y="3036332"/>
+                <a:ext cx="654029" cy="545068"/>
+              </a:xfrm>
+              <a:prstGeom prst="straightConnector1">
+                <a:avLst/>
+              </a:prstGeom>
+              <a:ln w="19050">
+                <a:solidFill>
+                  <a:schemeClr val="tx1"/>
+                </a:solidFill>
+                <a:prstDash val="dash"/>
+                <a:tailEnd type="stealth" w="lg" len="lg"/>
+              </a:ln>
+            </p:spPr>
+            <p:style>
+              <a:lnRef idx="1">
+                <a:schemeClr val="accent1"/>
+              </a:lnRef>
+              <a:fillRef idx="0">
+                <a:schemeClr val="accent1"/>
+              </a:fillRef>
+              <a:effectRef idx="0">
+                <a:schemeClr val="accent1"/>
+              </a:effectRef>
+              <a:fontRef idx="minor">
+                <a:schemeClr val="tx1"/>
+              </a:fontRef>
+            </p:style>
+          </p:cxnSp>
+        </p:grpSp>
+        <p:grpSp>
+          <p:nvGrpSpPr>
+            <p:cNvPr id="10" name="Group 9"/>
+            <p:cNvGrpSpPr/>
+            <p:nvPr/>
+          </p:nvGrpSpPr>
+          <p:grpSpPr>
+            <a:xfrm>
+              <a:off x="990600" y="3212068"/>
+              <a:ext cx="1871930" cy="826532"/>
+              <a:chOff x="990600" y="2907268"/>
+              <a:chExt cx="1871930" cy="826532"/>
+            </a:xfrm>
+          </p:grpSpPr>
+          <p:sp>
+            <p:nvSpPr>
+              <p:cNvPr id="11" name="TextBox 10"/>
+              <p:cNvSpPr txBox="1"/>
+              <p:nvPr/>
+            </p:nvSpPr>
+            <p:spPr>
+              <a:xfrm>
+                <a:off x="990600" y="2907268"/>
+                <a:ext cx="1064202" cy="369332"/>
+              </a:xfrm>
+              <a:prstGeom prst="rect">
+                <a:avLst/>
+              </a:prstGeom>
+              <a:solidFill>
+                <a:schemeClr val="bg1"/>
+              </a:solidFill>
+              <a:ln>
+                <a:solidFill>
+                  <a:srgbClr val="0070C0"/>
+                </a:solidFill>
+              </a:ln>
+            </p:spPr>
+            <p:txBody>
+              <a:bodyPr wrap="none" rtlCol="0">
+                <a:spAutoFit/>
+              </a:bodyPr>
+              <a:lstStyle/>
+              <a:p>
+                <a:r>
+                  <a:rPr lang="en-US" dirty="0" smtClean="0">
+                    <a:solidFill>
+                      <a:srgbClr val="0070C0"/>
+                    </a:solidFill>
+                  </a:rPr>
+                  <a:t>Process 1</a:t>
+                </a:r>
+                <a:endParaRPr lang="nl-BE" dirty="0">
+                  <a:solidFill>
+                    <a:srgbClr val="0070C0"/>
+                  </a:solidFill>
+                </a:endParaRPr>
+              </a:p>
+            </p:txBody>
+          </p:sp>
+          <p:sp>
+            <p:nvSpPr>
+              <p:cNvPr id="12" name="Rectangle 11"/>
+              <p:cNvSpPr/>
+              <p:nvPr/>
+            </p:nvSpPr>
+            <p:spPr>
+              <a:xfrm>
+                <a:off x="2710130" y="3429000"/>
+                <a:ext cx="152400" cy="304800"/>
+              </a:xfrm>
+              <a:prstGeom prst="rect">
+                <a:avLst/>
+              </a:prstGeom>
+              <a:noFill/>
+              <a:ln>
+                <a:solidFill>
+                  <a:srgbClr val="0070C0"/>
+                </a:solidFill>
+              </a:ln>
+            </p:spPr>
+            <p:style>
+              <a:lnRef idx="2">
+                <a:schemeClr val="accent1">
+                  <a:shade val="50000"/>
+                </a:schemeClr>
+              </a:lnRef>
+              <a:fillRef idx="1">
+                <a:schemeClr val="accent1"/>
+              </a:fillRef>
+              <a:effectRef idx="0">
+                <a:schemeClr val="accent1"/>
+              </a:effectRef>
+              <a:fontRef idx="minor">
+                <a:schemeClr val="lt1"/>
+              </a:fontRef>
+            </p:style>
+            <p:txBody>
+              <a:bodyPr rtlCol="0" anchor="ctr"/>
+              <a:lstStyle/>
+              <a:p>
+                <a:pPr algn="ctr"/>
+                <a:endParaRPr lang="nl-BE"/>
+              </a:p>
+            </p:txBody>
+          </p:sp>
+          <p:cxnSp>
+            <p:nvCxnSpPr>
+              <p:cNvPr id="13" name="Straight Arrow Connector 12"/>
+              <p:cNvCxnSpPr>
+                <a:stCxn id="11" idx="2"/>
+                <a:endCxn id="12" idx="1"/>
+              </p:cNvCxnSpPr>
+              <p:nvPr/>
+            </p:nvCxnSpPr>
+            <p:spPr>
+              <a:xfrm>
+                <a:off x="1522701" y="3276600"/>
+                <a:ext cx="1187429" cy="304800"/>
+              </a:xfrm>
+              <a:prstGeom prst="straightConnector1">
+                <a:avLst/>
+              </a:prstGeom>
+              <a:ln w="19050">
+                <a:solidFill>
+                  <a:srgbClr val="0070C0"/>
+                </a:solidFill>
+                <a:prstDash val="dash"/>
+                <a:tailEnd type="stealth" w="lg" len="lg"/>
+              </a:ln>
+            </p:spPr>
+            <p:style>
+              <a:lnRef idx="1">
+                <a:schemeClr val="accent1"/>
+              </a:lnRef>
+              <a:fillRef idx="0">
+                <a:schemeClr val="accent1"/>
+              </a:fillRef>
+              <a:effectRef idx="0">
+                <a:schemeClr val="accent1"/>
+              </a:effectRef>
+              <a:fontRef idx="minor">
+                <a:schemeClr val="tx1"/>
+              </a:fontRef>
+            </p:style>
+          </p:cxnSp>
+        </p:grpSp>
+        <p:grpSp>
+          <p:nvGrpSpPr>
+            <p:cNvPr id="14" name="Group 13"/>
+            <p:cNvGrpSpPr/>
+            <p:nvPr/>
+          </p:nvGrpSpPr>
+          <p:grpSpPr>
+            <a:xfrm>
+              <a:off x="990600" y="4038600"/>
+              <a:ext cx="1871930" cy="705920"/>
+              <a:chOff x="990600" y="3429000"/>
+              <a:chExt cx="1871930" cy="705920"/>
+            </a:xfrm>
+          </p:grpSpPr>
+          <p:sp>
+            <p:nvSpPr>
+              <p:cNvPr id="15" name="TextBox 14"/>
+              <p:cNvSpPr txBox="1"/>
+              <p:nvPr/>
+            </p:nvSpPr>
+            <p:spPr>
+              <a:xfrm>
+                <a:off x="990600" y="3765588"/>
+                <a:ext cx="1064202" cy="369332"/>
+              </a:xfrm>
+              <a:prstGeom prst="rect">
+                <a:avLst/>
+              </a:prstGeom>
+              <a:solidFill>
+                <a:schemeClr val="bg1"/>
+              </a:solidFill>
+              <a:ln>
+                <a:solidFill>
+                  <a:srgbClr val="C00000"/>
+                </a:solidFill>
+              </a:ln>
+            </p:spPr>
+            <p:txBody>
+              <a:bodyPr wrap="none" rtlCol="0">
+                <a:spAutoFit/>
+              </a:bodyPr>
+              <a:lstStyle/>
+              <a:p>
+                <a:r>
+                  <a:rPr lang="en-US" dirty="0" smtClean="0">
+                    <a:solidFill>
+                      <a:srgbClr val="C00000"/>
+                    </a:solidFill>
+                  </a:rPr>
+                  <a:t>Process 2</a:t>
+                </a:r>
+                <a:endParaRPr lang="nl-BE" dirty="0">
+                  <a:solidFill>
+                    <a:srgbClr val="C00000"/>
+                  </a:solidFill>
+                </a:endParaRPr>
+              </a:p>
+            </p:txBody>
+          </p:sp>
+          <p:sp>
+            <p:nvSpPr>
+              <p:cNvPr id="16" name="Rectangle 15"/>
+              <p:cNvSpPr/>
+              <p:nvPr/>
+            </p:nvSpPr>
+            <p:spPr>
+              <a:xfrm>
+                <a:off x="2710130" y="3429000"/>
+                <a:ext cx="152400" cy="304800"/>
+              </a:xfrm>
+              <a:prstGeom prst="rect">
+                <a:avLst/>
+              </a:prstGeom>
+              <a:noFill/>
+              <a:ln>
+                <a:solidFill>
+                  <a:srgbClr val="C00000"/>
+                </a:solidFill>
+              </a:ln>
+            </p:spPr>
+            <p:style>
+              <a:lnRef idx="2">
+                <a:schemeClr val="accent1">
+                  <a:shade val="50000"/>
+                </a:schemeClr>
+              </a:lnRef>
+              <a:fillRef idx="1">
+                <a:schemeClr val="accent1"/>
+              </a:fillRef>
+              <a:effectRef idx="0">
+                <a:schemeClr val="accent1"/>
+              </a:effectRef>
+              <a:fontRef idx="minor">
+                <a:schemeClr val="lt1"/>
+              </a:fontRef>
+            </p:style>
+            <p:txBody>
+              <a:bodyPr rtlCol="0" anchor="ctr"/>
+              <a:lstStyle/>
+              <a:p>
+                <a:pPr algn="ctr"/>
+                <a:endParaRPr lang="nl-BE"/>
+              </a:p>
+            </p:txBody>
+          </p:sp>
+          <p:cxnSp>
+            <p:nvCxnSpPr>
+              <p:cNvPr id="17" name="Straight Arrow Connector 16"/>
+              <p:cNvCxnSpPr>
+                <a:stCxn id="15" idx="0"/>
+                <a:endCxn id="16" idx="1"/>
+              </p:cNvCxnSpPr>
+              <p:nvPr/>
+            </p:nvCxnSpPr>
+            <p:spPr>
+              <a:xfrm flipV="1">
+                <a:off x="1522701" y="3581400"/>
+                <a:ext cx="1187429" cy="184188"/>
+              </a:xfrm>
+              <a:prstGeom prst="straightConnector1">
+                <a:avLst/>
+              </a:prstGeom>
+              <a:ln w="19050">
+                <a:solidFill>
+                  <a:srgbClr val="C00000"/>
+                </a:solidFill>
+                <a:prstDash val="dash"/>
+                <a:tailEnd type="stealth" w="lg" len="lg"/>
+              </a:ln>
+            </p:spPr>
+            <p:style>
+              <a:lnRef idx="1">
+                <a:schemeClr val="accent1"/>
+              </a:lnRef>
+              <a:fillRef idx="0">
+                <a:schemeClr val="accent1"/>
+              </a:fillRef>
+              <a:effectRef idx="0">
+                <a:schemeClr val="accent1"/>
+              </a:effectRef>
+              <a:fontRef idx="minor">
+                <a:schemeClr val="tx1"/>
+              </a:fontRef>
+            </p:style>
+          </p:cxnSp>
+        </p:grpSp>
+        <p:grpSp>
+          <p:nvGrpSpPr>
+            <p:cNvPr id="19" name="Group 18"/>
+            <p:cNvGrpSpPr/>
+            <p:nvPr/>
+          </p:nvGrpSpPr>
+          <p:grpSpPr>
+            <a:xfrm>
+              <a:off x="1450398" y="4343400"/>
+              <a:ext cx="1412132" cy="990600"/>
+              <a:chOff x="1450398" y="3429000"/>
+              <a:chExt cx="1412132" cy="990600"/>
+            </a:xfrm>
+          </p:grpSpPr>
+          <p:sp>
+            <p:nvSpPr>
+              <p:cNvPr id="20" name="TextBox 19"/>
+              <p:cNvSpPr txBox="1"/>
+              <p:nvPr/>
+            </p:nvSpPr>
+            <p:spPr>
+              <a:xfrm>
+                <a:off x="1450398" y="4050268"/>
+                <a:ext cx="1064202" cy="369332"/>
+              </a:xfrm>
+              <a:prstGeom prst="rect">
+                <a:avLst/>
+              </a:prstGeom>
+              <a:solidFill>
+                <a:schemeClr val="bg1"/>
+              </a:solidFill>
+              <a:ln>
+                <a:solidFill>
+                  <a:srgbClr val="00B050"/>
+                </a:solidFill>
+              </a:ln>
+            </p:spPr>
+            <p:txBody>
+              <a:bodyPr wrap="none" rtlCol="0">
+                <a:spAutoFit/>
+              </a:bodyPr>
+              <a:lstStyle/>
+              <a:p>
+                <a:r>
+                  <a:rPr lang="en-US" dirty="0" smtClean="0">
+                    <a:solidFill>
+                      <a:srgbClr val="00B050"/>
+                    </a:solidFill>
+                  </a:rPr>
+                  <a:t>Process 3</a:t>
+                </a:r>
+                <a:endParaRPr lang="nl-BE" dirty="0">
+                  <a:solidFill>
+                    <a:srgbClr val="00B050"/>
+                  </a:solidFill>
+                </a:endParaRPr>
+              </a:p>
+            </p:txBody>
+          </p:sp>
+          <p:sp>
+            <p:nvSpPr>
+              <p:cNvPr id="21" name="Rectangle 20"/>
+              <p:cNvSpPr/>
+              <p:nvPr/>
+            </p:nvSpPr>
+            <p:spPr>
+              <a:xfrm>
+                <a:off x="2710130" y="3429000"/>
+                <a:ext cx="152400" cy="304800"/>
+              </a:xfrm>
+              <a:prstGeom prst="rect">
+                <a:avLst/>
+              </a:prstGeom>
+              <a:noFill/>
+              <a:ln>
+                <a:solidFill>
+                  <a:srgbClr val="00B050"/>
+                </a:solidFill>
+              </a:ln>
+            </p:spPr>
+            <p:style>
+              <a:lnRef idx="2">
+                <a:schemeClr val="accent1">
+                  <a:shade val="50000"/>
+                </a:schemeClr>
+              </a:lnRef>
+              <a:fillRef idx="1">
+                <a:schemeClr val="accent1"/>
+              </a:fillRef>
+              <a:effectRef idx="0">
+                <a:schemeClr val="accent1"/>
+              </a:effectRef>
+              <a:fontRef idx="minor">
+                <a:schemeClr val="lt1"/>
+              </a:fontRef>
+            </p:style>
+            <p:txBody>
+              <a:bodyPr rtlCol="0" anchor="ctr"/>
+              <a:lstStyle/>
+              <a:p>
+                <a:pPr algn="ctr"/>
+                <a:endParaRPr lang="nl-BE"/>
+              </a:p>
+            </p:txBody>
+          </p:sp>
+          <p:cxnSp>
+            <p:nvCxnSpPr>
+              <p:cNvPr id="22" name="Straight Arrow Connector 21"/>
+              <p:cNvCxnSpPr>
+                <a:stCxn id="20" idx="0"/>
+                <a:endCxn id="21" idx="1"/>
+              </p:cNvCxnSpPr>
+              <p:nvPr/>
+            </p:nvCxnSpPr>
+            <p:spPr>
+              <a:xfrm flipV="1">
+                <a:off x="1982499" y="3581400"/>
+                <a:ext cx="727631" cy="468868"/>
+              </a:xfrm>
+              <a:prstGeom prst="straightConnector1">
+                <a:avLst/>
+              </a:prstGeom>
+              <a:ln w="19050">
+                <a:solidFill>
+                  <a:srgbClr val="00B050"/>
+                </a:solidFill>
+                <a:prstDash val="dash"/>
+                <a:tailEnd type="stealth" w="lg" len="lg"/>
+              </a:ln>
+            </p:spPr>
+            <p:style>
+              <a:lnRef idx="1">
+                <a:schemeClr val="accent1"/>
+              </a:lnRef>
+              <a:fillRef idx="0">
+                <a:schemeClr val="accent1"/>
+              </a:fillRef>
+              <a:effectRef idx="0">
+                <a:schemeClr val="accent1"/>
+              </a:effectRef>
+              <a:fontRef idx="minor">
+                <a:schemeClr val="tx1"/>
+              </a:fontRef>
+            </p:style>
+          </p:cxnSp>
+        </p:grpSp>
+      </p:grpSp>
+      <p:grpSp>
+        <p:nvGrpSpPr>
+          <p:cNvPr id="26" name="Group 25"/>
+          <p:cNvGrpSpPr/>
+          <p:nvPr/>
+        </p:nvGrpSpPr>
+        <p:grpSpPr>
+          <a:xfrm>
+            <a:off x="6127990" y="3657600"/>
+            <a:ext cx="1111010" cy="1131332"/>
+            <a:chOff x="6127990" y="3657600"/>
+            <a:chExt cx="1111010" cy="1131332"/>
+          </a:xfrm>
+        </p:grpSpPr>
+        <p:sp>
+          <p:nvSpPr>
+            <p:cNvPr id="24" name="Flowchart: Or 23"/>
+            <p:cNvSpPr/>
+            <p:nvPr/>
+          </p:nvSpPr>
+          <p:spPr>
+            <a:xfrm>
+              <a:off x="6324600" y="3657600"/>
+              <a:ext cx="685800" cy="685800"/>
+            </a:xfrm>
+            <a:prstGeom prst="flowChartOr">
+              <a:avLst/>
+            </a:prstGeom>
+            <a:solidFill>
+              <a:schemeClr val="bg1"/>
+            </a:solidFill>
+            <a:ln>
+              <a:solidFill>
+                <a:schemeClr val="tx1"/>
+              </a:solidFill>
+            </a:ln>
+          </p:spPr>
+          <p:style>
+            <a:lnRef idx="2">
+              <a:schemeClr val="accent1">
+                <a:shade val="50000"/>
+              </a:schemeClr>
+            </a:lnRef>
+            <a:fillRef idx="1">
+              <a:schemeClr val="accent1"/>
+            </a:fillRef>
+            <a:effectRef idx="0">
+              <a:schemeClr val="accent1"/>
+            </a:effectRef>
+            <a:fontRef idx="minor">
+              <a:schemeClr val="lt1"/>
+            </a:fontRef>
+          </p:style>
+          <p:txBody>
+            <a:bodyPr rtlCol="0" anchor="ctr"/>
+            <a:lstStyle/>
+            <a:p>
+              <a:pPr algn="ctr"/>
+              <a:endParaRPr lang="nl-BE"/>
+            </a:p>
+          </p:txBody>
+        </p:sp>
+        <p:sp>
+          <p:nvSpPr>
+            <p:cNvPr id="25" name="TextBox 24"/>
+            <p:cNvSpPr txBox="1"/>
+            <p:nvPr/>
+          </p:nvSpPr>
+          <p:spPr>
+            <a:xfrm>
+              <a:off x="6127990" y="4419600"/>
+              <a:ext cx="1111010" cy="369332"/>
+            </a:xfrm>
+            <a:prstGeom prst="rect">
+              <a:avLst/>
+            </a:prstGeom>
+            <a:noFill/>
+          </p:spPr>
+          <p:txBody>
+            <a:bodyPr wrap="none" rtlCol="0">
+              <a:spAutoFit/>
+            </a:bodyPr>
+            <a:lstStyle/>
+            <a:p>
+              <a:r>
+                <a:rPr lang="en-US" dirty="0" smtClean="0"/>
+                <a:t>aggregate</a:t>
+              </a:r>
+              <a:endParaRPr lang="nl-BE" dirty="0"/>
+            </a:p>
+          </p:txBody>
+        </p:sp>
+      </p:grpSp>
     </p:spTree>
     <p:extLst>
       <p:ext uri="{BB962C8B-B14F-4D97-AF65-F5344CB8AC3E}">
-        <p14:creationId xmlns:p14="http://schemas.microsoft.com/office/powerpoint/2010/main" val="3962184908"/>
+        <p14:creationId xmlns:p14="http://schemas.microsoft.com/office/powerpoint/2010/main" val="1153524669"/>
       </p:ext>
     </p:extLst>
   </p:cSld>
   <p:clrMapOvr>
     <a:masterClrMapping/>
   </p:clrMapOvr>
+  <p:timing>
+    <p:tnLst>
+      <p:par>
+        <p:cTn id="1" dur="indefinite" restart="never" nodeType="tmRoot">
+          <p:childTnLst>
+            <p:seq concurrent="1" nextAc="seek">
+              <p:cTn id="2" dur="indefinite" nodeType="mainSeq">
+                <p:childTnLst>
+                  <p:par>
+                    <p:cTn id="3" fill="hold">
+                      <p:stCondLst>
+                        <p:cond delay="indefinite"/>
+                      </p:stCondLst>
+                      <p:childTnLst>
+                        <p:par>
+                          <p:cTn id="4" fill="hold">
+                            <p:stCondLst>
+                              <p:cond delay="0"/>
+                            </p:stCondLst>
+                            <p:childTnLst>
+                              <p:par>
+                                <p:cTn id="5" presetID="63" presetClass="path" presetSubtype="0" accel="50000" decel="50000" fill="hold" nodeType="clickEffect">
+                                  <p:stCondLst>
+                                    <p:cond delay="0"/>
+                                  </p:stCondLst>
+                                  <p:childTnLst>
+                                    <p:animMotion origin="layout" path="M -2.77778E-7 -3.33333E-6 L 0.28108 -3.33333E-6 " pathEditMode="relative" rAng="0" ptsTypes="AA">
+                                      <p:cBhvr>
+                                        <p:cTn id="6" dur="2000" fill="hold"/>
+                                        <p:tgtEl>
+                                          <p:spTgt spid="23"/>
+                                        </p:tgtEl>
+                                        <p:attrNameLst>
+                                          <p:attrName>ppt_x</p:attrName>
+                                          <p:attrName>ppt_y</p:attrName>
+                                        </p:attrNameLst>
+                                      </p:cBhvr>
+                                      <p:rCtr x="14045" y="0"/>
+                                    </p:animMotion>
+                                  </p:childTnLst>
+                                </p:cTn>
+                              </p:par>
+                            </p:childTnLst>
+                          </p:cTn>
+                        </p:par>
+                      </p:childTnLst>
+                    </p:cTn>
+                  </p:par>
+                </p:childTnLst>
+              </p:cTn>
+              <p:prevCondLst>
+                <p:cond evt="onPrev" delay="0">
+                  <p:tgtEl>
+                    <p:sldTgt/>
+                  </p:tgtEl>
+                </p:cond>
+              </p:prevCondLst>
+              <p:nextCondLst>
+                <p:cond evt="onNext" delay="0">
+                  <p:tgtEl>
+                    <p:sldTgt/>
+                  </p:tgtEl>
+                </p:cond>
+              </p:nextCondLst>
+            </p:seq>
+          </p:childTnLst>
+        </p:cTn>
+      </p:par>
+    </p:tnLst>
+  </p:timing>
+</p:sld>
+</file>
+
+<file path=ppt/slides/slide9.xml><?xml version="1.0" encoding="utf-8"?>
+<p:sld xmlns:a="http://schemas.openxmlformats.org/drawingml/2006/main" xmlns:r="http://schemas.openxmlformats.org/officeDocument/2006/relationships" xmlns:p="http://schemas.openxmlformats.org/presentationml/2006/main">
+  <p:cSld>
+    <p:spTree>
+      <p:nvGrpSpPr>
+        <p:cNvPr id="1" name=""/>
+        <p:cNvGrpSpPr/>
+        <p:nvPr/>
+      </p:nvGrpSpPr>
+      <p:grpSpPr>
+        <a:xfrm>
+          <a:off x="0" y="0"/>
+          <a:ext cx="0" cy="0"/>
+          <a:chOff x="0" y="0"/>
+          <a:chExt cx="0" cy="0"/>
+        </a:xfrm>
+      </p:grpSpPr>
+      <p:sp>
+        <p:nvSpPr>
+          <p:cNvPr id="2" name="Title 1"/>
+          <p:cNvSpPr>
+            <a:spLocks noGrp="1"/>
+          </p:cNvSpPr>
+          <p:nvPr>
+            <p:ph type="title"/>
+          </p:nvPr>
+        </p:nvSpPr>
+        <p:spPr/>
+        <p:txBody>
+          <a:bodyPr/>
+          <a:lstStyle/>
+          <a:p>
+            <a:r>
+              <a:rPr lang="en-US" dirty="0" smtClean="0"/>
+              <a:t>Count a chunk</a:t>
+            </a:r>
+            <a:endParaRPr lang="nl-BE" dirty="0"/>
+          </a:p>
+        </p:txBody>
+      </p:sp>
+      <p:sp>
+        <p:nvSpPr>
+          <p:cNvPr id="3" name="Content Placeholder 2"/>
+          <p:cNvSpPr>
+            <a:spLocks noGrp="1"/>
+          </p:cNvSpPr>
+          <p:nvPr>
+            <p:ph idx="1"/>
+          </p:nvPr>
+        </p:nvSpPr>
+        <p:spPr/>
+        <p:txBody>
+          <a:bodyPr/>
+          <a:lstStyle/>
+          <a:p>
+            <a:r>
+              <a:rPr lang="en-US" dirty="0" smtClean="0"/>
+              <a:t>Given: file name, start position, chunk size</a:t>
+            </a:r>
+          </a:p>
+          <a:p>
+            <a:r>
+              <a:rPr lang="en-US" dirty="0" smtClean="0"/>
+              <a:t>Return: </a:t>
+            </a:r>
+            <a:r>
+              <a:rPr lang="en-US" dirty="0" err="1" smtClean="0">
+                <a:latin typeface="Courier New" panose="02070309020205020404" pitchFamily="49" charset="0"/>
+                <a:cs typeface="Courier New" panose="02070309020205020404" pitchFamily="49" charset="0"/>
+              </a:rPr>
+              <a:t>dict</a:t>
+            </a:r>
+            <a:r>
+              <a:rPr lang="en-US" dirty="0" smtClean="0"/>
+              <a:t> of counts</a:t>
+            </a:r>
+            <a:endParaRPr lang="nl-BE" dirty="0"/>
+          </a:p>
+        </p:txBody>
+      </p:sp>
+      <p:sp>
+        <p:nvSpPr>
+          <p:cNvPr id="4" name="TextBox 3"/>
+          <p:cNvSpPr txBox="1"/>
+          <p:nvPr/>
+        </p:nvSpPr>
+        <p:spPr>
+          <a:xfrm>
+            <a:off x="1143000" y="3005078"/>
+            <a:ext cx="6526146" cy="2862322"/>
+          </a:xfrm>
+          <a:prstGeom prst="rect">
+            <a:avLst/>
+          </a:prstGeom>
+          <a:solidFill>
+            <a:schemeClr val="bg1">
+              <a:lumMod val="85000"/>
+            </a:schemeClr>
+          </a:solidFill>
+        </p:spPr>
+        <p:txBody>
+          <a:bodyPr wrap="none" rtlCol="0">
+            <a:spAutoFit/>
+          </a:bodyPr>
+          <a:lstStyle/>
+          <a:p>
+            <a:r>
+              <a:rPr lang="nl-BE" dirty="0" err="1" smtClean="0">
+                <a:latin typeface="Courier New" panose="02070309020205020404" pitchFamily="49" charset="0"/>
+                <a:cs typeface="Courier New" panose="02070309020205020404" pitchFamily="49" charset="0"/>
+              </a:rPr>
+              <a:t>def</a:t>
+            </a:r>
+            <a:r>
+              <a:rPr lang="nl-BE" dirty="0" smtClean="0">
+                <a:latin typeface="Courier New" panose="02070309020205020404" pitchFamily="49" charset="0"/>
+                <a:cs typeface="Courier New" panose="02070309020205020404" pitchFamily="49" charset="0"/>
+              </a:rPr>
+              <a:t> </a:t>
+            </a:r>
+            <a:r>
+              <a:rPr lang="nl-BE" dirty="0" err="1">
+                <a:latin typeface="Courier New" panose="02070309020205020404" pitchFamily="49" charset="0"/>
+                <a:cs typeface="Courier New" panose="02070309020205020404" pitchFamily="49" charset="0"/>
+              </a:rPr>
+              <a:t>count_chunk</a:t>
+            </a:r>
+            <a:r>
+              <a:rPr lang="nl-BE" dirty="0">
+                <a:latin typeface="Courier New" panose="02070309020205020404" pitchFamily="49" charset="0"/>
+                <a:cs typeface="Courier New" panose="02070309020205020404" pitchFamily="49" charset="0"/>
+              </a:rPr>
+              <a:t>(</a:t>
+            </a:r>
+            <a:r>
+              <a:rPr lang="nl-BE" dirty="0" err="1">
+                <a:latin typeface="Courier New" panose="02070309020205020404" pitchFamily="49" charset="0"/>
+                <a:cs typeface="Courier New" panose="02070309020205020404" pitchFamily="49" charset="0"/>
+              </a:rPr>
+              <a:t>args</a:t>
+            </a:r>
+            <a:r>
+              <a:rPr lang="nl-BE" dirty="0">
+                <a:latin typeface="Courier New" panose="02070309020205020404" pitchFamily="49" charset="0"/>
+                <a:cs typeface="Courier New" panose="02070309020205020404" pitchFamily="49" charset="0"/>
+              </a:rPr>
+              <a:t>):</a:t>
+            </a:r>
+          </a:p>
+          <a:p>
+            <a:r>
+              <a:rPr lang="nl-BE" dirty="0">
+                <a:latin typeface="Courier New" panose="02070309020205020404" pitchFamily="49" charset="0"/>
+                <a:cs typeface="Courier New" panose="02070309020205020404" pitchFamily="49" charset="0"/>
+              </a:rPr>
+              <a:t>    </a:t>
+            </a:r>
+            <a:r>
+              <a:rPr lang="nl-BE" dirty="0" err="1">
+                <a:latin typeface="Courier New" panose="02070309020205020404" pitchFamily="49" charset="0"/>
+                <a:cs typeface="Courier New" panose="02070309020205020404" pitchFamily="49" charset="0"/>
+              </a:rPr>
+              <a:t>file_name</a:t>
+            </a:r>
+            <a:r>
+              <a:rPr lang="nl-BE" dirty="0">
+                <a:latin typeface="Courier New" panose="02070309020205020404" pitchFamily="49" charset="0"/>
+                <a:cs typeface="Courier New" panose="02070309020205020404" pitchFamily="49" charset="0"/>
+              </a:rPr>
+              <a:t>, </a:t>
+            </a:r>
+            <a:r>
+              <a:rPr lang="nl-BE" dirty="0" err="1">
+                <a:latin typeface="Courier New" panose="02070309020205020404" pitchFamily="49" charset="0"/>
+                <a:cs typeface="Courier New" panose="02070309020205020404" pitchFamily="49" charset="0"/>
+              </a:rPr>
+              <a:t>file_pos</a:t>
+            </a:r>
+            <a:r>
+              <a:rPr lang="nl-BE" dirty="0">
+                <a:latin typeface="Courier New" panose="02070309020205020404" pitchFamily="49" charset="0"/>
+                <a:cs typeface="Courier New" panose="02070309020205020404" pitchFamily="49" charset="0"/>
+              </a:rPr>
+              <a:t>, </a:t>
+            </a:r>
+            <a:r>
+              <a:rPr lang="nl-BE" dirty="0" err="1">
+                <a:latin typeface="Courier New" panose="02070309020205020404" pitchFamily="49" charset="0"/>
+                <a:cs typeface="Courier New" panose="02070309020205020404" pitchFamily="49" charset="0"/>
+              </a:rPr>
+              <a:t>chunk_size</a:t>
+            </a:r>
+            <a:r>
+              <a:rPr lang="nl-BE" dirty="0">
+                <a:latin typeface="Courier New" panose="02070309020205020404" pitchFamily="49" charset="0"/>
+                <a:cs typeface="Courier New" panose="02070309020205020404" pitchFamily="49" charset="0"/>
+              </a:rPr>
+              <a:t> = </a:t>
+            </a:r>
+            <a:r>
+              <a:rPr lang="nl-BE" dirty="0" err="1">
+                <a:latin typeface="Courier New" panose="02070309020205020404" pitchFamily="49" charset="0"/>
+                <a:cs typeface="Courier New" panose="02070309020205020404" pitchFamily="49" charset="0"/>
+              </a:rPr>
+              <a:t>args</a:t>
+            </a:r>
+            <a:endParaRPr lang="nl-BE" dirty="0">
+              <a:latin typeface="Courier New" panose="02070309020205020404" pitchFamily="49" charset="0"/>
+              <a:cs typeface="Courier New" panose="02070309020205020404" pitchFamily="49" charset="0"/>
+            </a:endParaRPr>
+          </a:p>
+          <a:p>
+            <a:r>
+              <a:rPr lang="nl-BE" dirty="0">
+                <a:latin typeface="Courier New" panose="02070309020205020404" pitchFamily="49" charset="0"/>
+                <a:cs typeface="Courier New" panose="02070309020205020404" pitchFamily="49" charset="0"/>
+              </a:rPr>
+              <a:t>    counter = {'A': 0, 'C': 0, 'G': 0, </a:t>
+            </a:r>
+            <a:r>
+              <a:rPr lang="nl-BE" dirty="0" err="1">
+                <a:latin typeface="Courier New" panose="02070309020205020404" pitchFamily="49" charset="0"/>
+                <a:cs typeface="Courier New" panose="02070309020205020404" pitchFamily="49" charset="0"/>
+              </a:rPr>
+              <a:t>'T</a:t>
+            </a:r>
+            <a:r>
+              <a:rPr lang="nl-BE" dirty="0">
+                <a:latin typeface="Courier New" panose="02070309020205020404" pitchFamily="49" charset="0"/>
+                <a:cs typeface="Courier New" panose="02070309020205020404" pitchFamily="49" charset="0"/>
+              </a:rPr>
+              <a:t>': 0}</a:t>
+            </a:r>
+          </a:p>
+          <a:p>
+            <a:r>
+              <a:rPr lang="nl-BE" dirty="0">
+                <a:latin typeface="Courier New" panose="02070309020205020404" pitchFamily="49" charset="0"/>
+                <a:cs typeface="Courier New" panose="02070309020205020404" pitchFamily="49" charset="0"/>
+              </a:rPr>
+              <a:t>    </a:t>
+            </a:r>
+            <a:r>
+              <a:rPr lang="nl-BE" dirty="0" err="1">
+                <a:latin typeface="Courier New" panose="02070309020205020404" pitchFamily="49" charset="0"/>
+                <a:cs typeface="Courier New" panose="02070309020205020404" pitchFamily="49" charset="0"/>
+              </a:rPr>
+              <a:t>with</a:t>
+            </a:r>
+            <a:r>
+              <a:rPr lang="nl-BE" dirty="0">
+                <a:latin typeface="Courier New" panose="02070309020205020404" pitchFamily="49" charset="0"/>
+                <a:cs typeface="Courier New" panose="02070309020205020404" pitchFamily="49" charset="0"/>
+              </a:rPr>
+              <a:t> open(</a:t>
+            </a:r>
+            <a:r>
+              <a:rPr lang="nl-BE" dirty="0" err="1">
+                <a:latin typeface="Courier New" panose="02070309020205020404" pitchFamily="49" charset="0"/>
+                <a:cs typeface="Courier New" panose="02070309020205020404" pitchFamily="49" charset="0"/>
+              </a:rPr>
+              <a:t>file_name</a:t>
+            </a:r>
+            <a:r>
+              <a:rPr lang="nl-BE" dirty="0">
+                <a:latin typeface="Courier New" panose="02070309020205020404" pitchFamily="49" charset="0"/>
+                <a:cs typeface="Courier New" panose="02070309020205020404" pitchFamily="49" charset="0"/>
+              </a:rPr>
+              <a:t>, 'r') as file:</a:t>
+            </a:r>
+          </a:p>
+          <a:p>
+            <a:r>
+              <a:rPr lang="nl-BE" dirty="0">
+                <a:latin typeface="Courier New" panose="02070309020205020404" pitchFamily="49" charset="0"/>
+                <a:cs typeface="Courier New" panose="02070309020205020404" pitchFamily="49" charset="0"/>
+              </a:rPr>
+              <a:t>        </a:t>
+            </a:r>
+            <a:r>
+              <a:rPr lang="nl-BE" dirty="0" err="1">
+                <a:latin typeface="Courier New" panose="02070309020205020404" pitchFamily="49" charset="0"/>
+                <a:cs typeface="Courier New" panose="02070309020205020404" pitchFamily="49" charset="0"/>
+              </a:rPr>
+              <a:t>file.seek</a:t>
+            </a:r>
+            <a:r>
+              <a:rPr lang="nl-BE" dirty="0">
+                <a:latin typeface="Courier New" panose="02070309020205020404" pitchFamily="49" charset="0"/>
+                <a:cs typeface="Courier New" panose="02070309020205020404" pitchFamily="49" charset="0"/>
+              </a:rPr>
+              <a:t>(</a:t>
+            </a:r>
+            <a:r>
+              <a:rPr lang="nl-BE" dirty="0" err="1">
+                <a:latin typeface="Courier New" panose="02070309020205020404" pitchFamily="49" charset="0"/>
+                <a:cs typeface="Courier New" panose="02070309020205020404" pitchFamily="49" charset="0"/>
+              </a:rPr>
+              <a:t>file_pos</a:t>
+            </a:r>
+            <a:r>
+              <a:rPr lang="nl-BE" dirty="0">
+                <a:latin typeface="Courier New" panose="02070309020205020404" pitchFamily="49" charset="0"/>
+                <a:cs typeface="Courier New" panose="02070309020205020404" pitchFamily="49" charset="0"/>
+              </a:rPr>
+              <a:t>)</a:t>
+            </a:r>
+          </a:p>
+          <a:p>
+            <a:r>
+              <a:rPr lang="nl-BE" dirty="0">
+                <a:latin typeface="Courier New" panose="02070309020205020404" pitchFamily="49" charset="0"/>
+                <a:cs typeface="Courier New" panose="02070309020205020404" pitchFamily="49" charset="0"/>
+              </a:rPr>
+              <a:t>        </a:t>
+            </a:r>
+            <a:r>
+              <a:rPr lang="nl-BE" dirty="0" err="1">
+                <a:latin typeface="Courier New" panose="02070309020205020404" pitchFamily="49" charset="0"/>
+                <a:cs typeface="Courier New" panose="02070309020205020404" pitchFamily="49" charset="0"/>
+              </a:rPr>
+              <a:t>dna</a:t>
+            </a:r>
+            <a:r>
+              <a:rPr lang="nl-BE" dirty="0">
+                <a:latin typeface="Courier New" panose="02070309020205020404" pitchFamily="49" charset="0"/>
+                <a:cs typeface="Courier New" panose="02070309020205020404" pitchFamily="49" charset="0"/>
+              </a:rPr>
+              <a:t> = </a:t>
+            </a:r>
+            <a:r>
+              <a:rPr lang="nl-BE" dirty="0" err="1">
+                <a:latin typeface="Courier New" panose="02070309020205020404" pitchFamily="49" charset="0"/>
+                <a:cs typeface="Courier New" panose="02070309020205020404" pitchFamily="49" charset="0"/>
+              </a:rPr>
+              <a:t>file.read</a:t>
+            </a:r>
+            <a:r>
+              <a:rPr lang="nl-BE" dirty="0">
+                <a:latin typeface="Courier New" panose="02070309020205020404" pitchFamily="49" charset="0"/>
+                <a:cs typeface="Courier New" panose="02070309020205020404" pitchFamily="49" charset="0"/>
+              </a:rPr>
+              <a:t>(</a:t>
+            </a:r>
+            <a:r>
+              <a:rPr lang="nl-BE" dirty="0" err="1">
+                <a:latin typeface="Courier New" panose="02070309020205020404" pitchFamily="49" charset="0"/>
+                <a:cs typeface="Courier New" panose="02070309020205020404" pitchFamily="49" charset="0"/>
+              </a:rPr>
+              <a:t>chunk_size</a:t>
+            </a:r>
+            <a:r>
+              <a:rPr lang="nl-BE" dirty="0">
+                <a:latin typeface="Courier New" panose="02070309020205020404" pitchFamily="49" charset="0"/>
+                <a:cs typeface="Courier New" panose="02070309020205020404" pitchFamily="49" charset="0"/>
+              </a:rPr>
+              <a:t>)</a:t>
+            </a:r>
+          </a:p>
+          <a:p>
+            <a:r>
+              <a:rPr lang="nl-BE" dirty="0">
+                <a:latin typeface="Courier New" panose="02070309020205020404" pitchFamily="49" charset="0"/>
+                <a:cs typeface="Courier New" panose="02070309020205020404" pitchFamily="49" charset="0"/>
+              </a:rPr>
+              <a:t>        </a:t>
+            </a:r>
+            <a:r>
+              <a:rPr lang="nl-BE" dirty="0" err="1">
+                <a:latin typeface="Courier New" panose="02070309020205020404" pitchFamily="49" charset="0"/>
+                <a:cs typeface="Courier New" panose="02070309020205020404" pitchFamily="49" charset="0"/>
+              </a:rPr>
+              <a:t>for</a:t>
+            </a:r>
+            <a:r>
+              <a:rPr lang="nl-BE" dirty="0">
+                <a:latin typeface="Courier New" panose="02070309020205020404" pitchFamily="49" charset="0"/>
+                <a:cs typeface="Courier New" panose="02070309020205020404" pitchFamily="49" charset="0"/>
+              </a:rPr>
+              <a:t> </a:t>
+            </a:r>
+            <a:r>
+              <a:rPr lang="nl-BE" dirty="0" err="1">
+                <a:latin typeface="Courier New" panose="02070309020205020404" pitchFamily="49" charset="0"/>
+                <a:cs typeface="Courier New" panose="02070309020205020404" pitchFamily="49" charset="0"/>
+              </a:rPr>
+              <a:t>char</a:t>
+            </a:r>
+            <a:r>
+              <a:rPr lang="nl-BE" dirty="0">
+                <a:latin typeface="Courier New" panose="02070309020205020404" pitchFamily="49" charset="0"/>
+                <a:cs typeface="Courier New" panose="02070309020205020404" pitchFamily="49" charset="0"/>
+              </a:rPr>
+              <a:t> in </a:t>
+            </a:r>
+            <a:r>
+              <a:rPr lang="nl-BE" dirty="0" err="1">
+                <a:latin typeface="Courier New" panose="02070309020205020404" pitchFamily="49" charset="0"/>
+                <a:cs typeface="Courier New" panose="02070309020205020404" pitchFamily="49" charset="0"/>
+              </a:rPr>
+              <a:t>dna</a:t>
+            </a:r>
+            <a:r>
+              <a:rPr lang="nl-BE" dirty="0">
+                <a:latin typeface="Courier New" panose="02070309020205020404" pitchFamily="49" charset="0"/>
+                <a:cs typeface="Courier New" panose="02070309020205020404" pitchFamily="49" charset="0"/>
+              </a:rPr>
+              <a:t>:</a:t>
+            </a:r>
+          </a:p>
+          <a:p>
+            <a:r>
+              <a:rPr lang="nl-BE" dirty="0">
+                <a:latin typeface="Courier New" panose="02070309020205020404" pitchFamily="49" charset="0"/>
+                <a:cs typeface="Courier New" panose="02070309020205020404" pitchFamily="49" charset="0"/>
+              </a:rPr>
+              <a:t>            </a:t>
+            </a:r>
+            <a:r>
+              <a:rPr lang="nl-BE" dirty="0" err="1">
+                <a:latin typeface="Courier New" panose="02070309020205020404" pitchFamily="49" charset="0"/>
+                <a:cs typeface="Courier New" panose="02070309020205020404" pitchFamily="49" charset="0"/>
+              </a:rPr>
+              <a:t>if</a:t>
+            </a:r>
+            <a:r>
+              <a:rPr lang="nl-BE" dirty="0">
+                <a:latin typeface="Courier New" panose="02070309020205020404" pitchFamily="49" charset="0"/>
+                <a:cs typeface="Courier New" panose="02070309020205020404" pitchFamily="49" charset="0"/>
+              </a:rPr>
+              <a:t> </a:t>
+            </a:r>
+            <a:r>
+              <a:rPr lang="nl-BE" dirty="0" err="1">
+                <a:latin typeface="Courier New" panose="02070309020205020404" pitchFamily="49" charset="0"/>
+                <a:cs typeface="Courier New" panose="02070309020205020404" pitchFamily="49" charset="0"/>
+              </a:rPr>
+              <a:t>char</a:t>
+            </a:r>
+            <a:r>
+              <a:rPr lang="nl-BE" dirty="0">
+                <a:latin typeface="Courier New" panose="02070309020205020404" pitchFamily="49" charset="0"/>
+                <a:cs typeface="Courier New" panose="02070309020205020404" pitchFamily="49" charset="0"/>
+              </a:rPr>
+              <a:t> in counter:</a:t>
+            </a:r>
+          </a:p>
+          <a:p>
+            <a:r>
+              <a:rPr lang="nl-BE" dirty="0">
+                <a:latin typeface="Courier New" panose="02070309020205020404" pitchFamily="49" charset="0"/>
+                <a:cs typeface="Courier New" panose="02070309020205020404" pitchFamily="49" charset="0"/>
+              </a:rPr>
+              <a:t>                counter[</a:t>
+            </a:r>
+            <a:r>
+              <a:rPr lang="nl-BE" dirty="0" err="1">
+                <a:latin typeface="Courier New" panose="02070309020205020404" pitchFamily="49" charset="0"/>
+                <a:cs typeface="Courier New" panose="02070309020205020404" pitchFamily="49" charset="0"/>
+              </a:rPr>
+              <a:t>char</a:t>
+            </a:r>
+            <a:r>
+              <a:rPr lang="nl-BE" dirty="0">
+                <a:latin typeface="Courier New" panose="02070309020205020404" pitchFamily="49" charset="0"/>
+                <a:cs typeface="Courier New" panose="02070309020205020404" pitchFamily="49" charset="0"/>
+              </a:rPr>
+              <a:t>] += 1</a:t>
+            </a:r>
+          </a:p>
+          <a:p>
+            <a:r>
+              <a:rPr lang="nl-BE" dirty="0">
+                <a:latin typeface="Courier New" panose="02070309020205020404" pitchFamily="49" charset="0"/>
+                <a:cs typeface="Courier New" panose="02070309020205020404" pitchFamily="49" charset="0"/>
+              </a:rPr>
+              <a:t>    return </a:t>
+            </a:r>
+            <a:r>
+              <a:rPr lang="nl-BE" dirty="0" smtClean="0">
+                <a:latin typeface="Courier New" panose="02070309020205020404" pitchFamily="49" charset="0"/>
+                <a:cs typeface="Courier New" panose="02070309020205020404" pitchFamily="49" charset="0"/>
+              </a:rPr>
+              <a:t>counter</a:t>
+            </a:r>
+            <a:endParaRPr lang="nl-BE" dirty="0">
+              <a:latin typeface="Courier New" panose="02070309020205020404" pitchFamily="49" charset="0"/>
+              <a:cs typeface="Courier New" panose="02070309020205020404" pitchFamily="49" charset="0"/>
+            </a:endParaRPr>
+          </a:p>
+        </p:txBody>
+      </p:sp>
+      <p:grpSp>
+        <p:nvGrpSpPr>
+          <p:cNvPr id="8" name="Group 7"/>
+          <p:cNvGrpSpPr/>
+          <p:nvPr/>
+        </p:nvGrpSpPr>
+        <p:grpSpPr>
+          <a:xfrm>
+            <a:off x="4038600" y="2362200"/>
+            <a:ext cx="3198600" cy="642878"/>
+            <a:chOff x="4038600" y="2362200"/>
+            <a:chExt cx="3198600" cy="642878"/>
+          </a:xfrm>
+        </p:grpSpPr>
+        <p:sp>
+          <p:nvSpPr>
+            <p:cNvPr id="5" name="TextBox 4"/>
+            <p:cNvSpPr txBox="1"/>
+            <p:nvPr/>
+          </p:nvSpPr>
+          <p:spPr>
+            <a:xfrm>
+              <a:off x="5486400" y="2362200"/>
+              <a:ext cx="1750800" cy="369332"/>
+            </a:xfrm>
+            <a:prstGeom prst="rect">
+              <a:avLst/>
+            </a:prstGeom>
+            <a:noFill/>
+            <a:ln>
+              <a:solidFill>
+                <a:schemeClr val="tx1"/>
+              </a:solidFill>
+            </a:ln>
+          </p:spPr>
+          <p:txBody>
+            <a:bodyPr wrap="none" rtlCol="0">
+              <a:spAutoFit/>
+            </a:bodyPr>
+            <a:lstStyle/>
+            <a:p>
+              <a:r>
+                <a:rPr lang="en-US" dirty="0" smtClean="0">
+                  <a:latin typeface="Courier New" panose="02070309020205020404" pitchFamily="49" charset="0"/>
+                  <a:cs typeface="Courier New" panose="02070309020205020404" pitchFamily="49" charset="0"/>
+                </a:rPr>
+                <a:t>tuple</a:t>
+              </a:r>
+              <a:r>
+                <a:rPr lang="en-US" dirty="0" smtClean="0"/>
+                <a:t> as input!</a:t>
+              </a:r>
+              <a:endParaRPr lang="nl-BE" dirty="0"/>
+            </a:p>
+          </p:txBody>
+        </p:sp>
+        <p:cxnSp>
+          <p:nvCxnSpPr>
+            <p:cNvPr id="7" name="Straight Arrow Connector 6"/>
+            <p:cNvCxnSpPr/>
+            <p:nvPr/>
+          </p:nvCxnSpPr>
+          <p:spPr>
+            <a:xfrm flipH="1">
+              <a:off x="4038600" y="2590800"/>
+              <a:ext cx="1447800" cy="414278"/>
+            </a:xfrm>
+            <a:prstGeom prst="straightConnector1">
+              <a:avLst/>
+            </a:prstGeom>
+            <a:ln w="12700">
+              <a:solidFill>
+                <a:schemeClr val="tx1"/>
+              </a:solidFill>
+              <a:tailEnd type="stealth" w="lg" len="lg"/>
+            </a:ln>
+          </p:spPr>
+          <p:style>
+            <a:lnRef idx="1">
+              <a:schemeClr val="accent1"/>
+            </a:lnRef>
+            <a:fillRef idx="0">
+              <a:schemeClr val="accent1"/>
+            </a:fillRef>
+            <a:effectRef idx="0">
+              <a:schemeClr val="accent1"/>
+            </a:effectRef>
+            <a:fontRef idx="minor">
+              <a:schemeClr val="tx1"/>
+            </a:fontRef>
+          </p:style>
+        </p:cxnSp>
+      </p:grpSp>
+    </p:spTree>
+    <p:extLst>
+      <p:ext uri="{BB962C8B-B14F-4D97-AF65-F5344CB8AC3E}">
+        <p14:creationId xmlns:p14="http://schemas.microsoft.com/office/powerpoint/2010/main" val="2452726112"/>
+      </p:ext>
+    </p:extLst>
+  </p:cSld>
+  <p:clrMapOvr>
+    <a:masterClrMapping/>
+  </p:clrMapOvr>
+  <p:timing>
+    <p:tnLst>
+      <p:par>
+        <p:cTn id="1" dur="indefinite" restart="never" nodeType="tmRoot"/>
+      </p:par>
+    </p:tnLst>
+  </p:timing>
 </p:sld>
 </file>
 

</xml_diff>